<commit_message>
Updating some typos on Lab 2 and fixing some of the signal names on the Lab 2 Block diagram and image.
</commit_message>
<xml_diff>
--- a/lab/lab2/ECE383_Lab2_Block_Diagram.pptx
+++ b/lab/lab2/ECE383_Lab2_Block_Diagram.pptx
@@ -3504,7 +3504,7 @@
         </p:nvSpPr>
         <p:spPr>
           <a:xfrm>
-            <a:off x="533400" y="2064346"/>
+            <a:off x="533400" y="1069460"/>
             <a:ext cx="17221200" cy="11270653"/>
           </a:xfrm>
           <a:prstGeom prst="roundRect">
@@ -3552,7 +3552,7 @@
         </p:nvSpPr>
         <p:spPr>
           <a:xfrm>
-            <a:off x="609600" y="2064346"/>
+            <a:off x="609600" y="1069460"/>
             <a:ext cx="914400" cy="461665"/>
           </a:xfrm>
           <a:prstGeom prst="rect">
@@ -3583,7 +3583,7 @@
         </p:nvSpPr>
         <p:spPr>
           <a:xfrm>
-            <a:off x="12134003" y="3411987"/>
+            <a:off x="12134003" y="2417101"/>
             <a:ext cx="1753829" cy="762000"/>
           </a:xfrm>
           <a:prstGeom prst="roundRect">
@@ -3631,7 +3631,7 @@
         </p:nvSpPr>
         <p:spPr>
           <a:xfrm>
-            <a:off x="12248917" y="3384949"/>
+            <a:off x="12248917" y="2390063"/>
             <a:ext cx="1524000" cy="369332"/>
           </a:xfrm>
           <a:prstGeom prst="rect">
@@ -3665,7 +3665,7 @@
         </p:nvCxnSpPr>
         <p:spPr>
           <a:xfrm>
-            <a:off x="11643555" y="3566648"/>
+            <a:off x="11643555" y="2571762"/>
             <a:ext cx="482693" cy="0"/>
           </a:xfrm>
           <a:prstGeom prst="line">
@@ -3701,7 +3701,7 @@
         </p:nvSpPr>
         <p:spPr>
           <a:xfrm>
-            <a:off x="11110155" y="3381982"/>
+            <a:off x="11110155" y="2387096"/>
             <a:ext cx="533400" cy="369332"/>
           </a:xfrm>
           <a:prstGeom prst="rect">
@@ -3735,7 +3735,7 @@
         </p:nvCxnSpPr>
         <p:spPr>
           <a:xfrm>
-            <a:off x="11641097" y="3800170"/>
+            <a:off x="11641097" y="2805284"/>
             <a:ext cx="485150" cy="0"/>
           </a:xfrm>
           <a:prstGeom prst="line">
@@ -3771,7 +3771,7 @@
         </p:nvSpPr>
         <p:spPr>
           <a:xfrm>
-            <a:off x="10623024" y="3615504"/>
+            <a:off x="10623024" y="2620618"/>
             <a:ext cx="1018073" cy="369332"/>
           </a:xfrm>
           <a:prstGeom prst="rect">
@@ -3805,7 +3805,7 @@
         </p:nvCxnSpPr>
         <p:spPr>
           <a:xfrm>
-            <a:off x="11650622" y="4027849"/>
+            <a:off x="11650622" y="3032963"/>
             <a:ext cx="485151" cy="0"/>
           </a:xfrm>
           <a:prstGeom prst="line">
@@ -3841,7 +3841,7 @@
         </p:nvSpPr>
         <p:spPr>
           <a:xfrm>
-            <a:off x="10891080" y="3843183"/>
+            <a:off x="10891080" y="2848297"/>
             <a:ext cx="759542" cy="369332"/>
           </a:xfrm>
           <a:prstGeom prst="rect">
@@ -3872,7 +3872,7 @@
         </p:nvCxnSpPr>
         <p:spPr>
           <a:xfrm flipV="1">
-            <a:off x="13886604" y="3612275"/>
+            <a:off x="13886604" y="2617389"/>
             <a:ext cx="835742" cy="3234"/>
           </a:xfrm>
           <a:prstGeom prst="line">
@@ -3908,7 +3908,7 @@
         </p:nvSpPr>
         <p:spPr>
           <a:xfrm>
-            <a:off x="13887832" y="3290920"/>
+            <a:off x="13887832" y="2296034"/>
             <a:ext cx="909484" cy="369332"/>
           </a:xfrm>
           <a:prstGeom prst="rect">
@@ -3938,7 +3938,7 @@
         </p:nvSpPr>
         <p:spPr>
           <a:xfrm>
-            <a:off x="929878" y="2613894"/>
+            <a:off x="929878" y="1619008"/>
             <a:ext cx="16367522" cy="8587506"/>
           </a:xfrm>
           <a:prstGeom prst="roundRect">
@@ -3986,7 +3986,7 @@
         </p:nvSpPr>
         <p:spPr>
           <a:xfrm>
-            <a:off x="990600" y="2613894"/>
+            <a:off x="990600" y="1619008"/>
             <a:ext cx="1844971" cy="461665"/>
           </a:xfrm>
           <a:prstGeom prst="rect">
@@ -4016,7 +4016,7 @@
         </p:nvSpPr>
         <p:spPr>
           <a:xfrm>
-            <a:off x="12126248" y="3381982"/>
+            <a:off x="12126248" y="2387096"/>
             <a:ext cx="533400" cy="369332"/>
           </a:xfrm>
           <a:prstGeom prst="rect">
@@ -4046,7 +4046,7 @@
         </p:nvSpPr>
         <p:spPr>
           <a:xfrm>
-            <a:off x="12126247" y="3615504"/>
+            <a:off x="12126247" y="2620618"/>
             <a:ext cx="992856" cy="369332"/>
           </a:xfrm>
           <a:prstGeom prst="rect">
@@ -4076,7 +4076,7 @@
         </p:nvSpPr>
         <p:spPr>
           <a:xfrm>
-            <a:off x="12135773" y="3843183"/>
+            <a:off x="12135773" y="2848297"/>
             <a:ext cx="759542" cy="369332"/>
           </a:xfrm>
           <a:prstGeom prst="rect">
@@ -4106,7 +4106,7 @@
         </p:nvSpPr>
         <p:spPr>
           <a:xfrm>
-            <a:off x="12169649" y="4304872"/>
+            <a:off x="12169649" y="3309986"/>
             <a:ext cx="1753829" cy="762000"/>
           </a:xfrm>
           <a:prstGeom prst="roundRect">
@@ -4154,7 +4154,7 @@
         </p:nvSpPr>
         <p:spPr>
           <a:xfrm>
-            <a:off x="12284563" y="4277834"/>
+            <a:off x="12284563" y="3282948"/>
             <a:ext cx="1524000" cy="369332"/>
           </a:xfrm>
           <a:prstGeom prst="rect">
@@ -4188,7 +4188,7 @@
         </p:nvCxnSpPr>
         <p:spPr>
           <a:xfrm>
-            <a:off x="11679201" y="4459533"/>
+            <a:off x="11679201" y="3464647"/>
             <a:ext cx="482693" cy="0"/>
           </a:xfrm>
           <a:prstGeom prst="line">
@@ -4224,7 +4224,7 @@
         </p:nvSpPr>
         <p:spPr>
           <a:xfrm>
-            <a:off x="11145801" y="4274867"/>
+            <a:off x="11145801" y="3279981"/>
             <a:ext cx="533400" cy="369332"/>
           </a:xfrm>
           <a:prstGeom prst="rect">
@@ -4257,7 +4257,7 @@
         </p:nvCxnSpPr>
         <p:spPr>
           <a:xfrm>
-            <a:off x="11676743" y="4693055"/>
+            <a:off x="11676743" y="3698169"/>
             <a:ext cx="485151" cy="0"/>
           </a:xfrm>
           <a:prstGeom prst="line">
@@ -4293,7 +4293,7 @@
         </p:nvSpPr>
         <p:spPr>
           <a:xfrm>
-            <a:off x="10668000" y="4508389"/>
+            <a:off x="10668000" y="3513503"/>
             <a:ext cx="1008743" cy="369332"/>
           </a:xfrm>
           <a:prstGeom prst="rect">
@@ -4327,7 +4327,7 @@
         </p:nvCxnSpPr>
         <p:spPr>
           <a:xfrm>
-            <a:off x="11686268" y="4920734"/>
+            <a:off x="11686268" y="3925848"/>
             <a:ext cx="485151" cy="0"/>
           </a:xfrm>
           <a:prstGeom prst="line">
@@ -4363,7 +4363,7 @@
         </p:nvSpPr>
         <p:spPr>
           <a:xfrm>
-            <a:off x="10926726" y="4736068"/>
+            <a:off x="10926726" y="3741182"/>
             <a:ext cx="759542" cy="369332"/>
           </a:xfrm>
           <a:prstGeom prst="rect">
@@ -4394,7 +4394,7 @@
         </p:nvSpPr>
         <p:spPr>
           <a:xfrm>
-            <a:off x="12161894" y="4274867"/>
+            <a:off x="12161894" y="3279981"/>
             <a:ext cx="533400" cy="369332"/>
           </a:xfrm>
           <a:prstGeom prst="rect">
@@ -4424,7 +4424,7 @@
         </p:nvSpPr>
         <p:spPr>
           <a:xfrm>
-            <a:off x="12171419" y="4508389"/>
+            <a:off x="12171419" y="3513503"/>
             <a:ext cx="944376" cy="369332"/>
           </a:xfrm>
           <a:prstGeom prst="rect">
@@ -4454,7 +4454,7 @@
         </p:nvSpPr>
         <p:spPr>
           <a:xfrm>
-            <a:off x="12171419" y="4736068"/>
+            <a:off x="12171419" y="3741182"/>
             <a:ext cx="759542" cy="369332"/>
           </a:xfrm>
           <a:prstGeom prst="rect">
@@ -4484,7 +4484,7 @@
         </p:nvCxnSpPr>
         <p:spPr>
           <a:xfrm flipV="1">
-            <a:off x="13912847" y="4467500"/>
+            <a:off x="13912847" y="3472614"/>
             <a:ext cx="835742" cy="3234"/>
           </a:xfrm>
           <a:prstGeom prst="line">
@@ -4520,7 +4520,7 @@
         </p:nvSpPr>
         <p:spPr>
           <a:xfrm>
-            <a:off x="13914075" y="4146145"/>
+            <a:off x="13914075" y="3151259"/>
             <a:ext cx="909484" cy="369332"/>
           </a:xfrm>
           <a:prstGeom prst="rect">
@@ -4550,7 +4550,7 @@
         </p:nvSpPr>
         <p:spPr>
           <a:xfrm>
-            <a:off x="967767" y="11840266"/>
+            <a:off x="967767" y="10845380"/>
             <a:ext cx="4570770" cy="1298582"/>
           </a:xfrm>
           <a:prstGeom prst="roundRect">
@@ -4598,7 +4598,7 @@
         </p:nvSpPr>
         <p:spPr>
           <a:xfrm>
-            <a:off x="959681" y="11840266"/>
+            <a:off x="959681" y="10845380"/>
             <a:ext cx="1844971" cy="461665"/>
           </a:xfrm>
           <a:prstGeom prst="rect">
@@ -4629,7 +4629,7 @@
         </p:nvSpPr>
         <p:spPr>
           <a:xfrm>
-            <a:off x="4019032" y="10487335"/>
+            <a:off x="4019032" y="9492449"/>
             <a:ext cx="911328" cy="369332"/>
           </a:xfrm>
           <a:prstGeom prst="rect">
@@ -4660,7 +4660,7 @@
         </p:nvSpPr>
         <p:spPr>
           <a:xfrm>
-            <a:off x="3485632" y="10487335"/>
+            <a:off x="3485632" y="9492449"/>
             <a:ext cx="570681" cy="369332"/>
           </a:xfrm>
           <a:prstGeom prst="rect">
@@ -4691,7 +4691,7 @@
         </p:nvCxnSpPr>
         <p:spPr>
           <a:xfrm>
-            <a:off x="3770972" y="10856667"/>
+            <a:off x="3770972" y="9861781"/>
             <a:ext cx="0" cy="1219201"/>
           </a:xfrm>
           <a:prstGeom prst="line">
@@ -4727,7 +4727,7 @@
         </p:nvCxnSpPr>
         <p:spPr>
           <a:xfrm>
-            <a:off x="4474696" y="10856668"/>
+            <a:off x="4474696" y="9861782"/>
             <a:ext cx="0" cy="1219200"/>
           </a:xfrm>
           <a:prstGeom prst="line">
@@ -4764,7 +4764,7 @@
         </p:nvSpPr>
         <p:spPr>
           <a:xfrm>
-            <a:off x="4479304" y="11477936"/>
+            <a:off x="4479304" y="10483050"/>
             <a:ext cx="911328" cy="369332"/>
           </a:xfrm>
           <a:prstGeom prst="rect">
@@ -4794,7 +4794,7 @@
         </p:nvSpPr>
         <p:spPr>
           <a:xfrm>
-            <a:off x="3190357" y="11477936"/>
+            <a:off x="3190357" y="10483050"/>
             <a:ext cx="570681" cy="369332"/>
           </a:xfrm>
           <a:prstGeom prst="rect">
@@ -4825,7 +4825,7 @@
         </p:nvSpPr>
         <p:spPr>
           <a:xfrm>
-            <a:off x="4479304" y="11858936"/>
+            <a:off x="4479304" y="10864050"/>
             <a:ext cx="911328" cy="369332"/>
           </a:xfrm>
           <a:prstGeom prst="rect">
@@ -4855,7 +4855,7 @@
         </p:nvSpPr>
         <p:spPr>
           <a:xfrm>
-            <a:off x="3190357" y="11858936"/>
+            <a:off x="3190357" y="10864050"/>
             <a:ext cx="570681" cy="369332"/>
           </a:xfrm>
           <a:prstGeom prst="rect">
@@ -4890,7 +4890,7 @@
         </p:nvCxnSpPr>
         <p:spPr>
           <a:xfrm flipV="1">
-            <a:off x="3599226" y="11313867"/>
+            <a:off x="3599226" y="10318981"/>
             <a:ext cx="323623" cy="304800"/>
           </a:xfrm>
           <a:prstGeom prst="line">
@@ -4925,7 +4925,7 @@
         </p:nvCxnSpPr>
         <p:spPr>
           <a:xfrm flipV="1">
-            <a:off x="4312884" y="11357802"/>
+            <a:off x="4312884" y="10362916"/>
             <a:ext cx="323623" cy="304800"/>
           </a:xfrm>
           <a:prstGeom prst="line">
@@ -4960,7 +4960,7 @@
         </p:nvSpPr>
         <p:spPr>
           <a:xfrm>
-            <a:off x="7518177" y="10487335"/>
+            <a:off x="7518177" y="9492449"/>
             <a:ext cx="1572174" cy="369332"/>
           </a:xfrm>
           <a:prstGeom prst="rect">
@@ -4991,7 +4991,7 @@
         </p:nvSpPr>
         <p:spPr>
           <a:xfrm>
-            <a:off x="6501685" y="10503204"/>
+            <a:off x="6501685" y="9508318"/>
             <a:ext cx="1416662" cy="369332"/>
           </a:xfrm>
           <a:prstGeom prst="rect">
@@ -5026,7 +5026,7 @@
         </p:nvCxnSpPr>
         <p:spPr>
           <a:xfrm>
-            <a:off x="7210015" y="10872536"/>
+            <a:off x="7210015" y="9877650"/>
             <a:ext cx="0" cy="1219201"/>
           </a:xfrm>
           <a:prstGeom prst="line">
@@ -5062,7 +5062,7 @@
         </p:nvCxnSpPr>
         <p:spPr>
           <a:xfrm>
-            <a:off x="8304264" y="10872537"/>
+            <a:off x="8304264" y="9877651"/>
             <a:ext cx="0" cy="1219200"/>
           </a:xfrm>
           <a:prstGeom prst="line">
@@ -5099,7 +5099,7 @@
         </p:nvSpPr>
         <p:spPr>
           <a:xfrm>
-            <a:off x="8308872" y="11493805"/>
+            <a:off x="8308872" y="10498919"/>
             <a:ext cx="911328" cy="369332"/>
           </a:xfrm>
           <a:prstGeom prst="rect">
@@ -5129,7 +5129,7 @@
         </p:nvSpPr>
         <p:spPr>
           <a:xfrm>
-            <a:off x="7210015" y="11493805"/>
+            <a:off x="7210015" y="10498919"/>
             <a:ext cx="570681" cy="369332"/>
           </a:xfrm>
           <a:prstGeom prst="rect">
@@ -5159,7 +5159,7 @@
         </p:nvSpPr>
         <p:spPr>
           <a:xfrm>
-            <a:off x="7584553" y="12145480"/>
+            <a:off x="7584553" y="11150594"/>
             <a:ext cx="1407047" cy="369332"/>
           </a:xfrm>
           <a:prstGeom prst="rect">
@@ -5194,7 +5194,7 @@
         </p:nvSpPr>
         <p:spPr>
           <a:xfrm>
-            <a:off x="6619651" y="12145480"/>
+            <a:off x="6619651" y="11150594"/>
             <a:ext cx="1202776" cy="369332"/>
           </a:xfrm>
           <a:prstGeom prst="rect">
@@ -5225,7 +5225,7 @@
         </p:nvCxnSpPr>
         <p:spPr>
           <a:xfrm flipV="1">
-            <a:off x="7038269" y="11329736"/>
+            <a:off x="7038269" y="10334850"/>
             <a:ext cx="323623" cy="304800"/>
           </a:xfrm>
           <a:prstGeom prst="line">
@@ -5260,7 +5260,7 @@
         </p:nvCxnSpPr>
         <p:spPr>
           <a:xfrm flipV="1">
-            <a:off x="8142452" y="11373671"/>
+            <a:off x="8142452" y="10378785"/>
             <a:ext cx="323623" cy="304800"/>
           </a:xfrm>
           <a:prstGeom prst="line">
@@ -5295,7 +5295,7 @@
         </p:nvSpPr>
         <p:spPr>
           <a:xfrm>
-            <a:off x="9880377" y="10469323"/>
+            <a:off x="9880377" y="9474437"/>
             <a:ext cx="1572174" cy="369332"/>
           </a:xfrm>
           <a:prstGeom prst="rect">
@@ -5326,7 +5326,7 @@
         </p:nvSpPr>
         <p:spPr>
           <a:xfrm>
-            <a:off x="8863885" y="10485192"/>
+            <a:off x="8863885" y="9490306"/>
             <a:ext cx="1416662" cy="369332"/>
           </a:xfrm>
           <a:prstGeom prst="rect">
@@ -5357,7 +5357,7 @@
         </p:nvCxnSpPr>
         <p:spPr>
           <a:xfrm>
-            <a:off x="9572215" y="10854524"/>
+            <a:off x="9572215" y="9859638"/>
             <a:ext cx="0" cy="1219201"/>
           </a:xfrm>
           <a:prstGeom prst="line">
@@ -5394,7 +5394,7 @@
         </p:nvCxnSpPr>
         <p:spPr>
           <a:xfrm>
-            <a:off x="10666464" y="10854525"/>
+            <a:off x="10666464" y="9859639"/>
             <a:ext cx="0" cy="1219200"/>
           </a:xfrm>
           <a:prstGeom prst="line">
@@ -5431,7 +5431,7 @@
         </p:nvSpPr>
         <p:spPr>
           <a:xfrm>
-            <a:off x="10671072" y="11475793"/>
+            <a:off x="10671072" y="10480907"/>
             <a:ext cx="911328" cy="369332"/>
           </a:xfrm>
           <a:prstGeom prst="rect">
@@ -5461,7 +5461,7 @@
         </p:nvSpPr>
         <p:spPr>
           <a:xfrm>
-            <a:off x="9572215" y="11475793"/>
+            <a:off x="9572215" y="10480907"/>
             <a:ext cx="570681" cy="369332"/>
           </a:xfrm>
           <a:prstGeom prst="rect">
@@ -5491,7 +5491,7 @@
         </p:nvSpPr>
         <p:spPr>
           <a:xfrm>
-            <a:off x="9946753" y="12127468"/>
+            <a:off x="9946753" y="11132582"/>
             <a:ext cx="1407047" cy="369332"/>
           </a:xfrm>
           <a:prstGeom prst="rect">
@@ -5522,7 +5522,7 @@
         </p:nvSpPr>
         <p:spPr>
           <a:xfrm>
-            <a:off x="8981851" y="12127468"/>
+            <a:off x="8981851" y="11132582"/>
             <a:ext cx="1202776" cy="369332"/>
           </a:xfrm>
           <a:prstGeom prst="rect">
@@ -5553,7 +5553,7 @@
         </p:nvCxnSpPr>
         <p:spPr>
           <a:xfrm flipV="1">
-            <a:off x="9400469" y="11311724"/>
+            <a:off x="9400469" y="10316838"/>
             <a:ext cx="323623" cy="304800"/>
           </a:xfrm>
           <a:prstGeom prst="line">
@@ -5588,7 +5588,7 @@
         </p:nvCxnSpPr>
         <p:spPr>
           <a:xfrm flipV="1">
-            <a:off x="10504652" y="11355659"/>
+            <a:off x="10504652" y="10360773"/>
             <a:ext cx="323623" cy="304800"/>
           </a:xfrm>
           <a:prstGeom prst="line">
@@ -5623,7 +5623,7 @@
         </p:nvSpPr>
         <p:spPr>
           <a:xfrm>
-            <a:off x="15290577" y="10469323"/>
+            <a:off x="15290577" y="9474437"/>
             <a:ext cx="1572174" cy="369332"/>
           </a:xfrm>
           <a:prstGeom prst="rect">
@@ -5654,7 +5654,7 @@
         </p:nvSpPr>
         <p:spPr>
           <a:xfrm>
-            <a:off x="14274085" y="10485192"/>
+            <a:off x="14274085" y="9490306"/>
             <a:ext cx="1416662" cy="369332"/>
           </a:xfrm>
           <a:prstGeom prst="rect">
@@ -5685,7 +5685,7 @@
         </p:nvCxnSpPr>
         <p:spPr>
           <a:xfrm>
-            <a:off x="14982415" y="10854524"/>
+            <a:off x="14982415" y="9859638"/>
             <a:ext cx="0" cy="1219201"/>
           </a:xfrm>
           <a:prstGeom prst="line">
@@ -5722,7 +5722,7 @@
         </p:nvCxnSpPr>
         <p:spPr>
           <a:xfrm>
-            <a:off x="16076664" y="10854525"/>
+            <a:off x="16076664" y="9859639"/>
             <a:ext cx="0" cy="1219200"/>
           </a:xfrm>
           <a:prstGeom prst="line">
@@ -5759,7 +5759,7 @@
         </p:nvSpPr>
         <p:spPr>
           <a:xfrm>
-            <a:off x="16081272" y="11475793"/>
+            <a:off x="16081272" y="10480907"/>
             <a:ext cx="911328" cy="369332"/>
           </a:xfrm>
           <a:prstGeom prst="rect">
@@ -5789,7 +5789,7 @@
         </p:nvSpPr>
         <p:spPr>
           <a:xfrm>
-            <a:off x="14982415" y="11475793"/>
+            <a:off x="14982415" y="10480907"/>
             <a:ext cx="570681" cy="369332"/>
           </a:xfrm>
           <a:prstGeom prst="rect">
@@ -5819,7 +5819,7 @@
         </p:nvSpPr>
         <p:spPr>
           <a:xfrm>
-            <a:off x="15356953" y="12039600"/>
+            <a:off x="15356953" y="11044714"/>
             <a:ext cx="1407047" cy="369332"/>
           </a:xfrm>
           <a:prstGeom prst="rect">
@@ -5850,7 +5850,7 @@
         </p:nvSpPr>
         <p:spPr>
           <a:xfrm>
-            <a:off x="14392051" y="12039600"/>
+            <a:off x="14392051" y="11044714"/>
             <a:ext cx="1202776" cy="369332"/>
           </a:xfrm>
           <a:prstGeom prst="rect">
@@ -5869,7 +5869,6 @@
               <a:rPr lang="en-US" sz="1800" dirty="0"/>
               <a:t>Q</a:t>
             </a:r>
-            <a:endParaRPr lang="en-US" sz="1800" dirty="0"/>
           </a:p>
         </p:txBody>
       </p:sp>
@@ -5881,7 +5880,7 @@
         </p:nvCxnSpPr>
         <p:spPr>
           <a:xfrm flipV="1">
-            <a:off x="14810669" y="11311724"/>
+            <a:off x="14810669" y="10316838"/>
             <a:ext cx="323623" cy="304800"/>
           </a:xfrm>
           <a:prstGeom prst="line">
@@ -5916,7 +5915,7 @@
         </p:nvCxnSpPr>
         <p:spPr>
           <a:xfrm flipV="1">
-            <a:off x="15914852" y="11355659"/>
+            <a:off x="15914852" y="10360773"/>
             <a:ext cx="323623" cy="304800"/>
           </a:xfrm>
           <a:prstGeom prst="line">
@@ -5951,7 +5950,7 @@
         </p:nvSpPr>
         <p:spPr>
           <a:xfrm>
-            <a:off x="14020800" y="9549286"/>
+            <a:off x="14020800" y="8554400"/>
             <a:ext cx="2924390" cy="1298582"/>
           </a:xfrm>
           <a:prstGeom prst="roundRect">
@@ -5999,7 +5998,7 @@
         </p:nvSpPr>
         <p:spPr>
           <a:xfrm>
-            <a:off x="14042735" y="9549286"/>
+            <a:off x="14042735" y="8554400"/>
             <a:ext cx="1844971" cy="461665"/>
           </a:xfrm>
           <a:prstGeom prst="rect">
@@ -6030,7 +6029,7 @@
         </p:nvSpPr>
         <p:spPr>
           <a:xfrm>
-            <a:off x="15597873" y="8546068"/>
+            <a:off x="15597873" y="7551182"/>
             <a:ext cx="1416662" cy="369332"/>
           </a:xfrm>
           <a:prstGeom prst="rect">
@@ -6063,7 +6062,7 @@
         </p:nvCxnSpPr>
         <p:spPr>
           <a:xfrm flipH="1">
-            <a:off x="16306203" y="8915400"/>
+            <a:off x="16306203" y="7920514"/>
             <a:ext cx="1" cy="646059"/>
           </a:xfrm>
           <a:prstGeom prst="line">
@@ -6100,7 +6099,7 @@
         </p:nvSpPr>
         <p:spPr>
           <a:xfrm>
-            <a:off x="16306203" y="9231868"/>
+            <a:off x="16306203" y="8236982"/>
             <a:ext cx="570681" cy="369332"/>
           </a:xfrm>
           <a:prstGeom prst="rect">
@@ -6130,7 +6129,7 @@
         </p:nvSpPr>
         <p:spPr>
           <a:xfrm>
-            <a:off x="15715839" y="9573126"/>
+            <a:off x="15715839" y="8578240"/>
             <a:ext cx="1202776" cy="369332"/>
           </a:xfrm>
           <a:prstGeom prst="rect">
@@ -6161,7 +6160,7 @@
         </p:nvCxnSpPr>
         <p:spPr>
           <a:xfrm flipV="1">
-            <a:off x="16134457" y="9067799"/>
+            <a:off x="16134457" y="8072913"/>
             <a:ext cx="323623" cy="304800"/>
           </a:xfrm>
           <a:prstGeom prst="line">
@@ -6198,7 +6197,7 @@
         </p:nvCxnSpPr>
         <p:spPr>
           <a:xfrm flipV="1">
-            <a:off x="16829010" y="5179524"/>
+            <a:off x="16829010" y="4184638"/>
             <a:ext cx="1458990" cy="5642"/>
           </a:xfrm>
           <a:prstGeom prst="line">
@@ -6234,7 +6233,7 @@
         </p:nvCxnSpPr>
         <p:spPr>
           <a:xfrm flipV="1">
-            <a:off x="16840200" y="5548198"/>
+            <a:off x="16840200" y="4553312"/>
             <a:ext cx="1447800" cy="5886"/>
           </a:xfrm>
           <a:prstGeom prst="line">
@@ -6270,7 +6269,7 @@
         </p:nvSpPr>
         <p:spPr>
           <a:xfrm>
-            <a:off x="15840868" y="5000500"/>
+            <a:off x="15840868" y="4005614"/>
             <a:ext cx="988142" cy="369332"/>
           </a:xfrm>
           <a:prstGeom prst="rect">
@@ -6301,7 +6300,7 @@
         </p:nvSpPr>
         <p:spPr>
           <a:xfrm>
-            <a:off x="15852058" y="5369418"/>
+            <a:off x="15852058" y="4374532"/>
             <a:ext cx="988142" cy="369332"/>
           </a:xfrm>
           <a:prstGeom prst="rect">
@@ -6332,7 +6331,7 @@
         </p:nvSpPr>
         <p:spPr>
           <a:xfrm>
-            <a:off x="14706600" y="3036333"/>
+            <a:off x="14706600" y="2041447"/>
             <a:ext cx="2144885" cy="4812267"/>
           </a:xfrm>
           <a:prstGeom prst="roundRect">
@@ -6380,7 +6379,7 @@
         </p:nvSpPr>
         <p:spPr>
           <a:xfrm>
-            <a:off x="15282513" y="3073562"/>
+            <a:off x="15282513" y="2078676"/>
             <a:ext cx="993058" cy="461665"/>
           </a:xfrm>
           <a:prstGeom prst="rect">
@@ -6411,7 +6410,7 @@
         </p:nvSpPr>
         <p:spPr>
           <a:xfrm>
-            <a:off x="9839871" y="5181601"/>
+            <a:off x="9839871" y="4186715"/>
             <a:ext cx="2199729" cy="4367686"/>
           </a:xfrm>
           <a:prstGeom prst="roundRect">
@@ -6459,7 +6458,7 @@
         </p:nvSpPr>
         <p:spPr>
           <a:xfrm>
-            <a:off x="1839742" y="3144201"/>
+            <a:off x="1839742" y="2149315"/>
             <a:ext cx="2066822" cy="830997"/>
           </a:xfrm>
           <a:prstGeom prst="rect">
@@ -6493,7 +6492,7 @@
         </p:nvCxnSpPr>
         <p:spPr>
           <a:xfrm flipV="1">
-            <a:off x="4326954" y="5979172"/>
+            <a:off x="4326954" y="4984286"/>
             <a:ext cx="482692" cy="1484"/>
           </a:xfrm>
           <a:prstGeom prst="line">
@@ -6530,7 +6529,7 @@
         </p:nvSpPr>
         <p:spPr>
           <a:xfrm>
-            <a:off x="3193593" y="5797473"/>
+            <a:off x="3193593" y="4802587"/>
             <a:ext cx="1133361" cy="366365"/>
           </a:xfrm>
           <a:prstGeom prst="rect">
@@ -6547,11 +6546,7 @@
             <a:pPr algn="r"/>
             <a:r>
               <a:rPr lang="en-US" sz="1800" dirty="0" err="1" smtClean="0"/>
-              <a:t>L_bus</a:t>
-            </a:r>
-            <a:r>
-              <a:rPr lang="en-US" sz="1800" dirty="0" err="1" smtClean="0"/>
-              <a:t>_in</a:t>
+              <a:t>L_bus_in</a:t>
             </a:r>
             <a:endParaRPr lang="en-US" sz="1800" dirty="0"/>
           </a:p>
@@ -6568,7 +6563,7 @@
         </p:nvCxnSpPr>
         <p:spPr>
           <a:xfrm>
-            <a:off x="4336371" y="6288895"/>
+            <a:off x="4336371" y="5294009"/>
             <a:ext cx="485150" cy="0"/>
           </a:xfrm>
           <a:prstGeom prst="line">
@@ -6605,7 +6600,7 @@
         </p:nvSpPr>
         <p:spPr>
           <a:xfrm>
-            <a:off x="3205468" y="6104229"/>
+            <a:off x="3205468" y="5109343"/>
             <a:ext cx="1130903" cy="369332"/>
           </a:xfrm>
           <a:prstGeom prst="rect">
@@ -6636,7 +6631,7 @@
         </p:nvSpPr>
         <p:spPr>
           <a:xfrm>
-            <a:off x="4809646" y="5794506"/>
+            <a:off x="4809646" y="4799620"/>
             <a:ext cx="1338711" cy="369332"/>
           </a:xfrm>
           <a:prstGeom prst="rect">
@@ -6652,11 +6647,7 @@
           <a:p>
             <a:r>
               <a:rPr lang="en-US" sz="1800" dirty="0" err="1" smtClean="0"/>
-              <a:t>L_bus</a:t>
-            </a:r>
-            <a:r>
-              <a:rPr lang="en-US" sz="1800" dirty="0" err="1" smtClean="0"/>
-              <a:t>_in</a:t>
+              <a:t>L_bus_in</a:t>
             </a:r>
             <a:endParaRPr lang="en-US" sz="1800" dirty="0"/>
           </a:p>
@@ -6670,7 +6661,7 @@
         </p:nvSpPr>
         <p:spPr>
           <a:xfrm>
-            <a:off x="4821521" y="6104229"/>
+            <a:off x="4821521" y="5109343"/>
             <a:ext cx="1259715" cy="369332"/>
           </a:xfrm>
           <a:prstGeom prst="rect">
@@ -6703,7 +6694,7 @@
         </p:nvCxnSpPr>
         <p:spPr>
           <a:xfrm flipV="1">
-            <a:off x="4343779" y="6592211"/>
+            <a:off x="4343779" y="5597325"/>
             <a:ext cx="482692" cy="2967"/>
           </a:xfrm>
           <a:prstGeom prst="line">
@@ -6739,7 +6730,7 @@
         </p:nvSpPr>
         <p:spPr>
           <a:xfrm>
-            <a:off x="3111064" y="6410512"/>
+            <a:off x="3111064" y="5415626"/>
             <a:ext cx="1232715" cy="369332"/>
           </a:xfrm>
           <a:prstGeom prst="rect">
@@ -6756,11 +6747,7 @@
             <a:pPr algn="r"/>
             <a:r>
               <a:rPr lang="en-US" sz="1800" dirty="0" err="1" smtClean="0"/>
-              <a:t>L_bus</a:t>
-            </a:r>
-            <a:r>
-              <a:rPr lang="en-US" sz="1800" dirty="0" err="1" smtClean="0"/>
-              <a:t>_out</a:t>
+              <a:t>L_bus_out</a:t>
             </a:r>
             <a:endParaRPr lang="en-US" sz="1800" dirty="0"/>
           </a:p>
@@ -6774,7 +6761,7 @@
         </p:nvCxnSpPr>
         <p:spPr>
           <a:xfrm>
-            <a:off x="4353196" y="6907647"/>
+            <a:off x="4353196" y="5912761"/>
             <a:ext cx="485150" cy="0"/>
           </a:xfrm>
           <a:prstGeom prst="line">
@@ -6810,7 +6797,7 @@
         </p:nvSpPr>
         <p:spPr>
           <a:xfrm>
-            <a:off x="3122939" y="6717268"/>
+            <a:off x="3122939" y="5722382"/>
             <a:ext cx="1230257" cy="369332"/>
           </a:xfrm>
           <a:prstGeom prst="rect">
@@ -6841,7 +6828,7 @@
         </p:nvSpPr>
         <p:spPr>
           <a:xfrm>
-            <a:off x="4826471" y="6407545"/>
+            <a:off x="4826471" y="5412659"/>
             <a:ext cx="1338711" cy="369332"/>
           </a:xfrm>
           <a:prstGeom prst="rect">
@@ -6871,7 +6858,7 @@
         </p:nvSpPr>
         <p:spPr>
           <a:xfrm>
-            <a:off x="4838346" y="6717268"/>
+            <a:off x="4838346" y="5722382"/>
             <a:ext cx="1259715" cy="369332"/>
           </a:xfrm>
           <a:prstGeom prst="rect">
@@ -6904,7 +6891,7 @@
         </p:nvCxnSpPr>
         <p:spPr>
           <a:xfrm>
-            <a:off x="4328930" y="5705572"/>
+            <a:off x="4328930" y="4710686"/>
             <a:ext cx="482693" cy="0"/>
           </a:xfrm>
           <a:prstGeom prst="line">
@@ -6940,7 +6927,7 @@
         </p:nvSpPr>
         <p:spPr>
           <a:xfrm>
-            <a:off x="3533670" y="5520906"/>
+            <a:off x="3533670" y="4526020"/>
             <a:ext cx="795260" cy="369332"/>
           </a:xfrm>
           <a:prstGeom prst="rect">
@@ -6971,7 +6958,7 @@
         </p:nvSpPr>
         <p:spPr>
           <a:xfrm>
-            <a:off x="4811623" y="5520906"/>
+            <a:off x="4811623" y="4526020"/>
             <a:ext cx="533400" cy="369332"/>
           </a:xfrm>
           <a:prstGeom prst="rect">
@@ -7004,7 +6991,7 @@
         </p:nvCxnSpPr>
         <p:spPr>
           <a:xfrm>
-            <a:off x="223758" y="4016176"/>
+            <a:off x="223758" y="3021290"/>
             <a:ext cx="1136900" cy="0"/>
           </a:xfrm>
           <a:prstGeom prst="line">
@@ -7040,7 +7027,7 @@
         </p:nvSpPr>
         <p:spPr>
           <a:xfrm>
-            <a:off x="-309642" y="3831510"/>
+            <a:off x="-309642" y="2836624"/>
             <a:ext cx="533400" cy="369332"/>
           </a:xfrm>
           <a:prstGeom prst="rect">
@@ -7074,7 +7061,7 @@
         </p:nvCxnSpPr>
         <p:spPr>
           <a:xfrm>
-            <a:off x="221301" y="4295953"/>
+            <a:off x="221301" y="3301067"/>
             <a:ext cx="1139357" cy="0"/>
           </a:xfrm>
           <a:prstGeom prst="line">
@@ -7110,7 +7097,7 @@
         </p:nvSpPr>
         <p:spPr>
           <a:xfrm>
-            <a:off x="-821375" y="4111287"/>
+            <a:off x="-821375" y="3116401"/>
             <a:ext cx="1042676" cy="369332"/>
           </a:xfrm>
           <a:prstGeom prst="rect">
@@ -7141,7 +7128,7 @@
         </p:nvSpPr>
         <p:spPr>
           <a:xfrm>
-            <a:off x="1360658" y="3831510"/>
+            <a:off x="1360658" y="2836624"/>
             <a:ext cx="533400" cy="369332"/>
           </a:xfrm>
           <a:prstGeom prst="rect">
@@ -7171,7 +7158,7 @@
         </p:nvSpPr>
         <p:spPr>
           <a:xfrm>
-            <a:off x="1360658" y="4111287"/>
+            <a:off x="1360658" y="3116401"/>
             <a:ext cx="933610" cy="369332"/>
           </a:xfrm>
           <a:prstGeom prst="rect">
@@ -7204,7 +7191,7 @@
         </p:nvCxnSpPr>
         <p:spPr>
           <a:xfrm>
-            <a:off x="216386" y="4553510"/>
+            <a:off x="216386" y="3558624"/>
             <a:ext cx="1139358" cy="0"/>
           </a:xfrm>
           <a:prstGeom prst="line">
@@ -7240,7 +7227,7 @@
         </p:nvSpPr>
         <p:spPr>
           <a:xfrm>
-            <a:off x="-543156" y="4368844"/>
+            <a:off x="-543156" y="3373958"/>
             <a:ext cx="759542" cy="369332"/>
           </a:xfrm>
           <a:prstGeom prst="rect">
@@ -7271,7 +7258,7 @@
         </p:nvSpPr>
         <p:spPr>
           <a:xfrm>
-            <a:off x="1355744" y="4368844"/>
+            <a:off x="1355744" y="3373958"/>
             <a:ext cx="759542" cy="369332"/>
           </a:xfrm>
           <a:prstGeom prst="rect">
@@ -7301,7 +7288,7 @@
         </p:nvSpPr>
         <p:spPr>
           <a:xfrm>
-            <a:off x="826325" y="3716975"/>
+            <a:off x="826325" y="2722089"/>
             <a:ext cx="533400" cy="369332"/>
           </a:xfrm>
           <a:prstGeom prst="rect">
@@ -7332,7 +7319,7 @@
         </p:nvSpPr>
         <p:spPr>
           <a:xfrm>
-            <a:off x="314592" y="3996752"/>
+            <a:off x="314592" y="3001866"/>
             <a:ext cx="1042676" cy="369332"/>
           </a:xfrm>
           <a:prstGeom prst="rect">
@@ -7363,7 +7350,7 @@
         </p:nvSpPr>
         <p:spPr>
           <a:xfrm>
-            <a:off x="592811" y="4254309"/>
+            <a:off x="592811" y="3259423"/>
             <a:ext cx="759542" cy="369332"/>
           </a:xfrm>
           <a:prstGeom prst="rect">
@@ -7397,7 +7384,7 @@
         </p:nvCxnSpPr>
         <p:spPr>
           <a:xfrm>
-            <a:off x="218808" y="4840600"/>
+            <a:off x="218808" y="3845714"/>
             <a:ext cx="1136899" cy="0"/>
           </a:xfrm>
           <a:prstGeom prst="line">
@@ -7434,7 +7421,7 @@
         </p:nvSpPr>
         <p:spPr>
           <a:xfrm>
-            <a:off x="-1524000" y="4655934"/>
+            <a:off x="-1524000" y="3661048"/>
             <a:ext cx="1742808" cy="369332"/>
           </a:xfrm>
           <a:prstGeom prst="rect">
@@ -7468,7 +7455,7 @@
         </p:nvCxnSpPr>
         <p:spPr>
           <a:xfrm>
-            <a:off x="216351" y="5120377"/>
+            <a:off x="216351" y="4125491"/>
             <a:ext cx="1139356" cy="0"/>
           </a:xfrm>
           <a:prstGeom prst="line">
@@ -7504,7 +7491,7 @@
         </p:nvSpPr>
         <p:spPr>
           <a:xfrm>
-            <a:off x="-1524000" y="4935711"/>
+            <a:off x="-1524000" y="3940825"/>
             <a:ext cx="1740351" cy="369332"/>
           </a:xfrm>
           <a:prstGeom prst="rect">
@@ -7535,7 +7522,7 @@
         </p:nvSpPr>
         <p:spPr>
           <a:xfrm>
-            <a:off x="1355707" y="4655934"/>
+            <a:off x="1355707" y="3661048"/>
             <a:ext cx="1837398" cy="369332"/>
           </a:xfrm>
           <a:prstGeom prst="rect">
@@ -7565,7 +7552,7 @@
         </p:nvSpPr>
         <p:spPr>
           <a:xfrm>
-            <a:off x="1355707" y="4935711"/>
+            <a:off x="1355707" y="3940825"/>
             <a:ext cx="2070250" cy="369332"/>
           </a:xfrm>
           <a:prstGeom prst="rect">
@@ -7587,7 +7574,6 @@
               <a:rPr lang="en-US" sz="1800" dirty="0"/>
               <a:t>(In)</a:t>
             </a:r>
-            <a:endParaRPr lang="en-US" sz="1800" dirty="0"/>
           </a:p>
         </p:txBody>
       </p:sp>
@@ -7602,7 +7588,7 @@
         </p:nvCxnSpPr>
         <p:spPr>
           <a:xfrm>
-            <a:off x="223311" y="5377934"/>
+            <a:off x="223311" y="4383048"/>
             <a:ext cx="1127482" cy="0"/>
           </a:xfrm>
           <a:prstGeom prst="line">
@@ -7639,7 +7625,7 @@
         </p:nvSpPr>
         <p:spPr>
           <a:xfrm>
-            <a:off x="-1512125" y="5193268"/>
+            <a:off x="-1512125" y="4198382"/>
             <a:ext cx="1735436" cy="369332"/>
           </a:xfrm>
           <a:prstGeom prst="rect">
@@ -7670,7 +7656,7 @@
         </p:nvSpPr>
         <p:spPr>
           <a:xfrm>
-            <a:off x="1350793" y="5193268"/>
+            <a:off x="1350793" y="4198382"/>
             <a:ext cx="2134839" cy="369332"/>
           </a:xfrm>
           <a:prstGeom prst="rect">
@@ -7711,7 +7697,7 @@
         </p:nvCxnSpPr>
         <p:spPr>
           <a:xfrm>
-            <a:off x="218808" y="5659191"/>
+            <a:off x="218808" y="4664305"/>
             <a:ext cx="1136899" cy="0"/>
           </a:xfrm>
           <a:prstGeom prst="line">
@@ -7748,7 +7734,7 @@
         </p:nvSpPr>
         <p:spPr>
           <a:xfrm>
-            <a:off x="-1524000" y="5474525"/>
+            <a:off x="-1524000" y="4479639"/>
             <a:ext cx="1742808" cy="369332"/>
           </a:xfrm>
           <a:prstGeom prst="rect">
@@ -7779,7 +7765,7 @@
         </p:nvSpPr>
         <p:spPr>
           <a:xfrm>
-            <a:off x="1355707" y="5474525"/>
+            <a:off x="1355707" y="4479639"/>
             <a:ext cx="1837398" cy="369332"/>
           </a:xfrm>
           <a:prstGeom prst="rect">
@@ -7812,7 +7798,7 @@
         </p:nvCxnSpPr>
         <p:spPr>
           <a:xfrm>
-            <a:off x="230683" y="5935291"/>
+            <a:off x="230683" y="4940405"/>
             <a:ext cx="1136899" cy="0"/>
           </a:xfrm>
           <a:prstGeom prst="line">
@@ -7849,7 +7835,7 @@
         </p:nvSpPr>
         <p:spPr>
           <a:xfrm>
-            <a:off x="-1512125" y="5750625"/>
+            <a:off x="-1512125" y="4755739"/>
             <a:ext cx="1742808" cy="369332"/>
           </a:xfrm>
           <a:prstGeom prst="rect">
@@ -7880,7 +7866,7 @@
         </p:nvSpPr>
         <p:spPr>
           <a:xfrm>
-            <a:off x="1367582" y="5750625"/>
+            <a:off x="1367582" y="4755739"/>
             <a:ext cx="1837398" cy="369332"/>
           </a:xfrm>
           <a:prstGeom prst="rect">
@@ -7913,7 +7899,7 @@
         </p:nvCxnSpPr>
         <p:spPr>
           <a:xfrm>
-            <a:off x="230683" y="6240091"/>
+            <a:off x="230683" y="5245205"/>
             <a:ext cx="1136899" cy="0"/>
           </a:xfrm>
           <a:prstGeom prst="line">
@@ -7950,7 +7936,7 @@
         </p:nvSpPr>
         <p:spPr>
           <a:xfrm>
-            <a:off x="-1512125" y="6055425"/>
+            <a:off x="-1512125" y="5060539"/>
             <a:ext cx="1742808" cy="369332"/>
           </a:xfrm>
           <a:prstGeom prst="rect">
@@ -7981,7 +7967,7 @@
         </p:nvSpPr>
         <p:spPr>
           <a:xfrm>
-            <a:off x="1367582" y="6055425"/>
+            <a:off x="1367582" y="5060539"/>
             <a:ext cx="1837398" cy="369332"/>
           </a:xfrm>
           <a:prstGeom prst="rect">
@@ -8014,7 +8000,7 @@
         </p:nvCxnSpPr>
         <p:spPr>
           <a:xfrm>
-            <a:off x="230683" y="6516191"/>
+            <a:off x="230683" y="5521305"/>
             <a:ext cx="1136899" cy="0"/>
           </a:xfrm>
           <a:prstGeom prst="line">
@@ -8051,7 +8037,7 @@
         </p:nvSpPr>
         <p:spPr>
           <a:xfrm>
-            <a:off x="-1512125" y="6331525"/>
+            <a:off x="-1512125" y="5336639"/>
             <a:ext cx="1742808" cy="369332"/>
           </a:xfrm>
           <a:prstGeom prst="rect">
@@ -8082,7 +8068,7 @@
         </p:nvSpPr>
         <p:spPr>
           <a:xfrm>
-            <a:off x="1367582" y="6331525"/>
+            <a:off x="1367582" y="5336639"/>
             <a:ext cx="1837398" cy="369332"/>
           </a:xfrm>
           <a:prstGeom prst="rect">
@@ -8112,7 +8098,7 @@
         </p:nvSpPr>
         <p:spPr>
           <a:xfrm>
-            <a:off x="2115199" y="7310152"/>
+            <a:off x="2115199" y="6315266"/>
             <a:ext cx="1548505" cy="1376648"/>
           </a:xfrm>
           <a:prstGeom prst="roundRect">
@@ -8160,7 +8146,7 @@
         </p:nvSpPr>
         <p:spPr>
           <a:xfrm>
-            <a:off x="2129942" y="7309758"/>
+            <a:off x="2129942" y="6314872"/>
             <a:ext cx="1524000" cy="369332"/>
           </a:xfrm>
           <a:prstGeom prst="rect">
@@ -8193,7 +8179,7 @@
         </p:nvCxnSpPr>
         <p:spPr>
           <a:xfrm>
-            <a:off x="1625397" y="8142175"/>
+            <a:off x="1625397" y="7147289"/>
             <a:ext cx="482693" cy="0"/>
           </a:xfrm>
           <a:prstGeom prst="line">
@@ -8231,7 +8217,7 @@
         </p:nvCxnSpPr>
         <p:spPr>
           <a:xfrm>
-            <a:off x="1622939" y="8421952"/>
+            <a:off x="1622939" y="7427066"/>
             <a:ext cx="485150" cy="0"/>
           </a:xfrm>
           <a:prstGeom prst="line">
@@ -8267,7 +8253,7 @@
         </p:nvSpPr>
         <p:spPr>
           <a:xfrm>
-            <a:off x="2108090" y="7957509"/>
+            <a:off x="2108090" y="6962623"/>
             <a:ext cx="533400" cy="369332"/>
           </a:xfrm>
           <a:prstGeom prst="rect">
@@ -8297,7 +8283,7 @@
         </p:nvSpPr>
         <p:spPr>
           <a:xfrm>
-            <a:off x="2108089" y="8237286"/>
+            <a:off x="2108089" y="7242400"/>
             <a:ext cx="816569" cy="369332"/>
           </a:xfrm>
           <a:prstGeom prst="rect">
@@ -8327,7 +8313,7 @@
         </p:nvCxnSpPr>
         <p:spPr>
           <a:xfrm>
-            <a:off x="3620656" y="7848122"/>
+            <a:off x="3620656" y="6853236"/>
             <a:ext cx="568958" cy="0"/>
           </a:xfrm>
           <a:prstGeom prst="line">
@@ -8364,7 +8350,7 @@
         </p:nvSpPr>
         <p:spPr>
           <a:xfrm>
-            <a:off x="2661588" y="7663456"/>
+            <a:off x="2661588" y="6668570"/>
             <a:ext cx="990600" cy="369332"/>
           </a:xfrm>
           <a:prstGeom prst="rect">
@@ -8395,7 +8381,7 @@
         </p:nvCxnSpPr>
         <p:spPr>
           <a:xfrm>
-            <a:off x="3633964" y="8153843"/>
+            <a:off x="3633964" y="7158957"/>
             <a:ext cx="555650" cy="0"/>
           </a:xfrm>
           <a:prstGeom prst="line">
@@ -8432,7 +8418,7 @@
         </p:nvSpPr>
         <p:spPr>
           <a:xfrm>
-            <a:off x="2661588" y="7969177"/>
+            <a:off x="2661588" y="6974291"/>
             <a:ext cx="988142" cy="369332"/>
           </a:xfrm>
           <a:prstGeom prst="rect">
@@ -8463,7 +8449,7 @@
         </p:nvSpPr>
         <p:spPr>
           <a:xfrm>
-            <a:off x="3669778" y="7471646"/>
+            <a:off x="3669778" y="6476760"/>
             <a:ext cx="1408545" cy="369332"/>
           </a:xfrm>
           <a:prstGeom prst="rect">
@@ -8493,7 +8479,7 @@
         </p:nvSpPr>
         <p:spPr>
           <a:xfrm>
-            <a:off x="3620656" y="7808642"/>
+            <a:off x="3620656" y="6813756"/>
             <a:ext cx="1408544" cy="369332"/>
           </a:xfrm>
           <a:prstGeom prst="rect">
@@ -8523,7 +8509,7 @@
         </p:nvSpPr>
         <p:spPr>
           <a:xfrm>
-            <a:off x="1571037" y="7766958"/>
+            <a:off x="1571037" y="6772072"/>
             <a:ext cx="533400" cy="369332"/>
           </a:xfrm>
           <a:prstGeom prst="rect">
@@ -8554,7 +8540,7 @@
         </p:nvSpPr>
         <p:spPr>
           <a:xfrm>
-            <a:off x="1116514" y="8046735"/>
+            <a:off x="1116514" y="7051849"/>
             <a:ext cx="985465" cy="369332"/>
           </a:xfrm>
           <a:prstGeom prst="rect">
@@ -8587,7 +8573,7 @@
         </p:nvCxnSpPr>
         <p:spPr>
           <a:xfrm>
-            <a:off x="216351" y="3244334"/>
+            <a:off x="216351" y="2249448"/>
             <a:ext cx="740849" cy="0"/>
           </a:xfrm>
           <a:prstGeom prst="line">
@@ -8623,7 +8609,7 @@
         </p:nvSpPr>
         <p:spPr>
           <a:xfrm>
-            <a:off x="957200" y="3059668"/>
+            <a:off x="957200" y="2064782"/>
             <a:ext cx="759542" cy="369332"/>
           </a:xfrm>
           <a:prstGeom prst="rect">
@@ -8653,7 +8639,7 @@
         </p:nvSpPr>
         <p:spPr>
           <a:xfrm>
-            <a:off x="1371600" y="3147951"/>
+            <a:off x="1371600" y="2153065"/>
             <a:ext cx="2952226" cy="5919849"/>
           </a:xfrm>
           <a:prstGeom prst="roundRect">
@@ -8701,7 +8687,7 @@
         </p:nvSpPr>
         <p:spPr>
           <a:xfrm>
-            <a:off x="9911313" y="5202151"/>
+            <a:off x="9911313" y="4207265"/>
             <a:ext cx="2066822" cy="461665"/>
           </a:xfrm>
           <a:prstGeom prst="rect">
@@ -8732,7 +8718,7 @@
         </p:nvSpPr>
         <p:spPr>
           <a:xfrm>
-            <a:off x="5863180" y="2844726"/>
+            <a:off x="5863180" y="1849840"/>
             <a:ext cx="1959248" cy="762000"/>
           </a:xfrm>
           <a:prstGeom prst="roundRect">
@@ -8780,7 +8766,7 @@
         </p:nvSpPr>
         <p:spPr>
           <a:xfrm>
-            <a:off x="6096000" y="2817688"/>
+            <a:off x="6096000" y="1822802"/>
             <a:ext cx="1524000" cy="646331"/>
           </a:xfrm>
           <a:prstGeom prst="rect">
@@ -8814,7 +8800,7 @@
         </p:nvCxnSpPr>
         <p:spPr>
           <a:xfrm>
-            <a:off x="5384707" y="3232666"/>
+            <a:off x="5384707" y="2237780"/>
             <a:ext cx="485151" cy="0"/>
           </a:xfrm>
           <a:prstGeom prst="line">
@@ -8850,7 +8836,7 @@
         </p:nvSpPr>
         <p:spPr>
           <a:xfrm>
-            <a:off x="4625165" y="3048000"/>
+            <a:off x="4625165" y="2053114"/>
             <a:ext cx="759542" cy="369332"/>
           </a:xfrm>
           <a:prstGeom prst="rect">
@@ -8881,7 +8867,7 @@
         </p:nvSpPr>
         <p:spPr>
           <a:xfrm>
-            <a:off x="5869858" y="3048000"/>
+            <a:off x="5869858" y="2053114"/>
             <a:ext cx="759542" cy="369332"/>
           </a:xfrm>
           <a:prstGeom prst="rect">
@@ -8911,7 +8897,7 @@
         </p:nvCxnSpPr>
         <p:spPr>
           <a:xfrm rot="16200000" flipH="1">
-            <a:off x="6801492" y="3622713"/>
+            <a:off x="6801492" y="2627827"/>
             <a:ext cx="647585" cy="564961"/>
           </a:xfrm>
           <a:prstGeom prst="bentConnector3">
@@ -8951,7 +8937,7 @@
         </p:nvCxnSpPr>
         <p:spPr>
           <a:xfrm rot="5400000">
-            <a:off x="6281156" y="3639194"/>
+            <a:off x="6281156" y="2644308"/>
             <a:ext cx="594116" cy="529180"/>
           </a:xfrm>
           <a:prstGeom prst="bentConnector3">
@@ -8989,7 +8975,7 @@
         </p:nvSpPr>
         <p:spPr>
           <a:xfrm rot="10800000">
-            <a:off x="7032352" y="4217184"/>
+            <a:off x="7032352" y="3222298"/>
             <a:ext cx="1741624" cy="729313"/>
           </a:xfrm>
           <a:prstGeom prst="trapezoid">
@@ -9037,7 +9023,7 @@
         </p:nvSpPr>
         <p:spPr>
           <a:xfrm>
-            <a:off x="7141164" y="4431268"/>
+            <a:off x="7141164" y="3436382"/>
             <a:ext cx="1524000" cy="369332"/>
           </a:xfrm>
           <a:prstGeom prst="rect">
@@ -9062,13 +9048,13 @@
       </p:sp>
       <p:sp>
         <p:nvSpPr>
-          <p:cNvPr id="303" name="Rounded Rectangle 302"/>
+          <p:cNvPr id="318" name="Rounded Rectangle 317"/>
           <p:cNvSpPr/>
           <p:nvPr/>
         </p:nvSpPr>
         <p:spPr>
           <a:xfrm>
-            <a:off x="4934968" y="4200842"/>
+            <a:off x="12445998" y="7507248"/>
             <a:ext cx="1770632" cy="762000"/>
           </a:xfrm>
           <a:prstGeom prst="roundRect">
@@ -9110,13 +9096,13 @@
       </p:sp>
       <p:sp>
         <p:nvSpPr>
-          <p:cNvPr id="304" name="TextBox 303"/>
-          <p:cNvSpPr txBox="1"/>
-          <p:nvPr/>
-        </p:nvSpPr>
-        <p:spPr>
-          <a:xfrm>
-            <a:off x="5058284" y="4397176"/>
+          <p:cNvPr id="319" name="TextBox 318"/>
+          <p:cNvSpPr txBox="1"/>
+          <p:nvPr/>
+        </p:nvSpPr>
+        <p:spPr>
+          <a:xfrm>
+            <a:off x="12569314" y="7703582"/>
             <a:ext cx="1524000" cy="369332"/>
           </a:xfrm>
           <a:prstGeom prst="rect">
@@ -9141,13 +9127,13 @@
       </p:sp>
       <p:cxnSp>
         <p:nvCxnSpPr>
-          <p:cNvPr id="305" name="Straight Connector 304"/>
+          <p:cNvPr id="320" name="Straight Connector 319"/>
           <p:cNvCxnSpPr/>
           <p:nvPr/>
         </p:nvCxnSpPr>
         <p:spPr>
           <a:xfrm>
-            <a:off x="5345023" y="3647620"/>
+            <a:off x="12856053" y="6954026"/>
             <a:ext cx="35" cy="550628"/>
           </a:xfrm>
           <a:prstGeom prst="line">
@@ -9175,219 +9161,6 @@
           </a:fontRef>
         </p:style>
       </p:cxnSp>
-      <p:sp>
-        <p:nvSpPr>
-          <p:cNvPr id="306" name="TextBox 305"/>
-          <p:cNvSpPr txBox="1"/>
-          <p:nvPr/>
-        </p:nvSpPr>
-        <p:spPr>
-          <a:xfrm>
-            <a:off x="5345023" y="3667263"/>
-            <a:ext cx="911328" cy="369332"/>
-          </a:xfrm>
-          <a:prstGeom prst="rect">
-            <a:avLst/>
-          </a:prstGeom>
-          <a:noFill/>
-        </p:spPr>
-        <p:txBody>
-          <a:bodyPr wrap="square" lIns="91440" tIns="45720" rIns="91440" bIns="45720" rtlCol="0">
-            <a:spAutoFit/>
-          </a:bodyPr>
-          <a:lstStyle/>
-          <a:p>
-            <a:r>
-              <a:rPr lang="en-US" sz="1800" dirty="0" smtClean="0"/>
-              <a:t>3FF</a:t>
-            </a:r>
-            <a:endParaRPr lang="en-US" sz="1800" dirty="0"/>
-          </a:p>
-        </p:txBody>
-      </p:sp>
-      <p:cxnSp>
-        <p:nvCxnSpPr>
-          <p:cNvPr id="307" name="Straight Connector 306"/>
-          <p:cNvCxnSpPr>
-            <a:stCxn id="528" idx="2"/>
-          </p:cNvCxnSpPr>
-          <p:nvPr/>
-        </p:nvCxnSpPr>
-        <p:spPr>
-          <a:xfrm flipH="1">
-            <a:off x="8288077" y="1821418"/>
-            <a:ext cx="34946" cy="2395766"/>
-          </a:xfrm>
-          <a:prstGeom prst="line">
-            <a:avLst/>
-          </a:prstGeom>
-          <a:ln w="38100">
-            <a:solidFill>
-              <a:schemeClr val="tx1"/>
-            </a:solidFill>
-            <a:tailEnd type="triangle"/>
-          </a:ln>
-        </p:spPr>
-        <p:style>
-          <a:lnRef idx="1">
-            <a:schemeClr val="accent1"/>
-          </a:lnRef>
-          <a:fillRef idx="0">
-            <a:schemeClr val="accent1"/>
-          </a:fillRef>
-          <a:effectRef idx="0">
-            <a:schemeClr val="accent1"/>
-          </a:effectRef>
-          <a:fontRef idx="minor">
-            <a:schemeClr val="tx1"/>
-          </a:fontRef>
-        </p:style>
-      </p:cxnSp>
-      <p:sp>
-        <p:nvSpPr>
-          <p:cNvPr id="318" name="Rounded Rectangle 317"/>
-          <p:cNvSpPr/>
-          <p:nvPr/>
-        </p:nvSpPr>
-        <p:spPr>
-          <a:xfrm>
-            <a:off x="12445998" y="8502134"/>
-            <a:ext cx="1770632" cy="762000"/>
-          </a:xfrm>
-          <a:prstGeom prst="roundRect">
-            <a:avLst>
-              <a:gd name="adj" fmla="val 13495"/>
-            </a:avLst>
-          </a:prstGeom>
-          <a:noFill/>
-          <a:ln>
-            <a:solidFill>
-              <a:schemeClr val="tx1"/>
-            </a:solidFill>
-          </a:ln>
-        </p:spPr>
-        <p:style>
-          <a:lnRef idx="2">
-            <a:schemeClr val="accent1">
-              <a:shade val="50000"/>
-            </a:schemeClr>
-          </a:lnRef>
-          <a:fillRef idx="1">
-            <a:schemeClr val="accent1"/>
-          </a:fillRef>
-          <a:effectRef idx="0">
-            <a:schemeClr val="accent1"/>
-          </a:effectRef>
-          <a:fontRef idx="minor">
-            <a:schemeClr val="lt1"/>
-          </a:fontRef>
-        </p:style>
-        <p:txBody>
-          <a:bodyPr lIns="91440" tIns="45720" rIns="91440" bIns="45720" spcCol="0" rtlCol="0" anchor="ctr"/>
-          <a:lstStyle/>
-          <a:p>
-            <a:pPr algn="ctr"/>
-            <a:endParaRPr lang="en-US" sz="1800"/>
-          </a:p>
-        </p:txBody>
-      </p:sp>
-      <p:sp>
-        <p:nvSpPr>
-          <p:cNvPr id="319" name="TextBox 318"/>
-          <p:cNvSpPr txBox="1"/>
-          <p:nvPr/>
-        </p:nvSpPr>
-        <p:spPr>
-          <a:xfrm>
-            <a:off x="12569314" y="8698468"/>
-            <a:ext cx="1524000" cy="369332"/>
-          </a:xfrm>
-          <a:prstGeom prst="rect">
-            <a:avLst/>
-          </a:prstGeom>
-          <a:noFill/>
-        </p:spPr>
-        <p:txBody>
-          <a:bodyPr wrap="square" lIns="91440" tIns="45720" rIns="91440" bIns="45720" rtlCol="0">
-            <a:spAutoFit/>
-          </a:bodyPr>
-          <a:lstStyle/>
-          <a:p>
-            <a:pPr algn="ctr"/>
-            <a:r>
-              <a:rPr lang="en-US" sz="1800" b="1" dirty="0" smtClean="0"/>
-              <a:t>Compare</a:t>
-            </a:r>
-            <a:endParaRPr lang="en-US" sz="4400" b="1" dirty="0"/>
-          </a:p>
-        </p:txBody>
-      </p:sp>
-      <p:cxnSp>
-        <p:nvCxnSpPr>
-          <p:cNvPr id="320" name="Straight Connector 319"/>
-          <p:cNvCxnSpPr/>
-          <p:nvPr/>
-        </p:nvCxnSpPr>
-        <p:spPr>
-          <a:xfrm>
-            <a:off x="12856053" y="7948912"/>
-            <a:ext cx="35" cy="550628"/>
-          </a:xfrm>
-          <a:prstGeom prst="line">
-            <a:avLst/>
-          </a:prstGeom>
-          <a:ln w="38100">
-            <a:solidFill>
-              <a:schemeClr val="tx1"/>
-            </a:solidFill>
-            <a:tailEnd type="triangle"/>
-          </a:ln>
-        </p:spPr>
-        <p:style>
-          <a:lnRef idx="1">
-            <a:schemeClr val="accent1"/>
-          </a:lnRef>
-          <a:fillRef idx="0">
-            <a:schemeClr val="accent1"/>
-          </a:fillRef>
-          <a:effectRef idx="0">
-            <a:schemeClr val="accent1"/>
-          </a:effectRef>
-          <a:fontRef idx="minor">
-            <a:schemeClr val="tx1"/>
-          </a:fontRef>
-        </p:style>
-      </p:cxnSp>
-      <p:sp>
-        <p:nvSpPr>
-          <p:cNvPr id="321" name="TextBox 320"/>
-          <p:cNvSpPr txBox="1"/>
-          <p:nvPr/>
-        </p:nvSpPr>
-        <p:spPr>
-          <a:xfrm>
-            <a:off x="12856053" y="7968555"/>
-            <a:ext cx="911328" cy="369332"/>
-          </a:xfrm>
-          <a:prstGeom prst="rect">
-            <a:avLst/>
-          </a:prstGeom>
-          <a:noFill/>
-        </p:spPr>
-        <p:txBody>
-          <a:bodyPr wrap="square" lIns="91440" tIns="45720" rIns="91440" bIns="45720" rtlCol="0">
-            <a:spAutoFit/>
-          </a:bodyPr>
-          <a:lstStyle/>
-          <a:p>
-            <a:r>
-              <a:rPr lang="en-US" sz="1800" dirty="0" smtClean="0"/>
-              <a:t>3FF</a:t>
-            </a:r>
-            <a:endParaRPr lang="en-US" sz="1800" dirty="0"/>
-          </a:p>
-        </p:txBody>
-      </p:sp>
       <p:cxnSp>
         <p:nvCxnSpPr>
           <p:cNvPr id="325" name="Straight Connector 324"/>
@@ -9396,7 +9169,7 @@
         </p:nvCxnSpPr>
         <p:spPr>
           <a:xfrm>
-            <a:off x="13767346" y="7949515"/>
+            <a:off x="13767346" y="6954629"/>
             <a:ext cx="35" cy="550628"/>
           </a:xfrm>
           <a:prstGeom prst="line">
@@ -9432,7 +9205,7 @@
         </p:nvCxnSpPr>
         <p:spPr>
           <a:xfrm>
-            <a:off x="12043850" y="7962779"/>
+            <a:off x="12043850" y="6967893"/>
             <a:ext cx="812238" cy="0"/>
           </a:xfrm>
           <a:prstGeom prst="line">
@@ -9468,7 +9241,7 @@
         </p:nvSpPr>
         <p:spPr>
           <a:xfrm>
-            <a:off x="10813593" y="7772400"/>
+            <a:off x="10813593" y="6777514"/>
             <a:ext cx="1230257" cy="369332"/>
           </a:xfrm>
           <a:prstGeom prst="rect">
@@ -9499,7 +9272,7 @@
         </p:nvSpPr>
         <p:spPr>
           <a:xfrm>
-            <a:off x="12052002" y="7600950"/>
+            <a:off x="12052002" y="6606064"/>
             <a:ext cx="1259715" cy="369332"/>
           </a:xfrm>
           <a:prstGeom prst="rect">
@@ -9529,7 +9302,7 @@
         </p:nvSpPr>
         <p:spPr>
           <a:xfrm>
-            <a:off x="13795272" y="7974568"/>
+            <a:off x="13795272" y="6979682"/>
             <a:ext cx="911328" cy="369332"/>
           </a:xfrm>
           <a:prstGeom prst="rect">
@@ -9562,7 +9335,7 @@
         </p:nvCxnSpPr>
         <p:spPr>
           <a:xfrm flipV="1">
-            <a:off x="13782561" y="6473561"/>
+            <a:off x="13782561" y="5478675"/>
             <a:ext cx="951692" cy="1484"/>
           </a:xfrm>
           <a:prstGeom prst="line">
@@ -9599,7 +9372,7 @@
         </p:nvSpPr>
         <p:spPr>
           <a:xfrm>
-            <a:off x="12649200" y="6291862"/>
+            <a:off x="12649200" y="5296976"/>
             <a:ext cx="1133361" cy="366365"/>
           </a:xfrm>
           <a:prstGeom prst="rect">
@@ -9630,7 +9403,7 @@
         </p:nvSpPr>
         <p:spPr>
           <a:xfrm>
-            <a:off x="14734253" y="6288895"/>
+            <a:off x="14734253" y="5294009"/>
             <a:ext cx="1338711" cy="369332"/>
           </a:xfrm>
           <a:prstGeom prst="rect">
@@ -9663,7 +9436,7 @@
         </p:nvCxnSpPr>
         <p:spPr>
           <a:xfrm flipV="1">
-            <a:off x="12043850" y="6901934"/>
+            <a:off x="12043850" y="5907048"/>
             <a:ext cx="2678603" cy="5713"/>
           </a:xfrm>
           <a:prstGeom prst="line">
@@ -9700,7 +9473,7 @@
         </p:nvSpPr>
         <p:spPr>
           <a:xfrm>
-            <a:off x="12049239" y="6553200"/>
+            <a:off x="12049239" y="5558314"/>
             <a:ext cx="1133361" cy="366365"/>
           </a:xfrm>
           <a:prstGeom prst="rect">
@@ -9730,7 +9503,7 @@
         </p:nvSpPr>
         <p:spPr>
           <a:xfrm>
-            <a:off x="14722453" y="6717268"/>
+            <a:off x="14722453" y="5722382"/>
             <a:ext cx="1338711" cy="369332"/>
           </a:xfrm>
           <a:prstGeom prst="rect">
@@ -9760,7 +9533,7 @@
         </p:nvSpPr>
         <p:spPr>
           <a:xfrm>
-            <a:off x="14288319" y="6488669"/>
+            <a:off x="14288319" y="5493783"/>
             <a:ext cx="570681" cy="369332"/>
           </a:xfrm>
           <a:prstGeom prst="rect">
@@ -9790,7 +9563,7 @@
         </p:nvCxnSpPr>
         <p:spPr>
           <a:xfrm flipV="1">
-            <a:off x="14116573" y="6324600"/>
+            <a:off x="14116573" y="5329714"/>
             <a:ext cx="323623" cy="304800"/>
           </a:xfrm>
           <a:prstGeom prst="line">
@@ -9825,7 +9598,7 @@
         </p:nvSpPr>
         <p:spPr>
           <a:xfrm>
-            <a:off x="14288319" y="6869668"/>
+            <a:off x="14288319" y="5874782"/>
             <a:ext cx="570681" cy="369332"/>
           </a:xfrm>
           <a:prstGeom prst="rect">
@@ -9855,7 +9628,7 @@
         </p:nvCxnSpPr>
         <p:spPr>
           <a:xfrm flipV="1">
-            <a:off x="14116573" y="6705599"/>
+            <a:off x="14116573" y="5710713"/>
             <a:ext cx="323623" cy="304800"/>
           </a:xfrm>
           <a:prstGeom prst="line">
@@ -9890,7 +9663,7 @@
         </p:nvSpPr>
         <p:spPr>
           <a:xfrm>
-            <a:off x="10813593" y="6722981"/>
+            <a:off x="10813593" y="5728095"/>
             <a:ext cx="1230257" cy="369332"/>
           </a:xfrm>
           <a:prstGeom prst="rect">
@@ -9921,7 +9694,7 @@
         </p:nvCxnSpPr>
         <p:spPr>
           <a:xfrm>
-            <a:off x="12023747" y="6077071"/>
+            <a:off x="12023747" y="5082185"/>
             <a:ext cx="545567" cy="0"/>
           </a:xfrm>
           <a:prstGeom prst="line">
@@ -9958,7 +9731,7 @@
         </p:nvSpPr>
         <p:spPr>
           <a:xfrm>
-            <a:off x="10797740" y="5898118"/>
+            <a:off x="10797740" y="4903232"/>
             <a:ext cx="1230257" cy="369332"/>
           </a:xfrm>
           <a:prstGeom prst="rect">
@@ -9980,36 +9753,6 @@
             <a:r>
               <a:rPr lang="en-US" sz="1800" dirty="0" err="1" smtClean="0"/>
               <a:t>rENB</a:t>
-            </a:r>
-            <a:endParaRPr lang="en-US" sz="1800" dirty="0"/>
-          </a:p>
-        </p:txBody>
-      </p:sp>
-      <p:sp>
-        <p:nvSpPr>
-          <p:cNvPr id="346" name="TextBox 345"/>
-          <p:cNvSpPr txBox="1"/>
-          <p:nvPr/>
-        </p:nvSpPr>
-        <p:spPr>
-          <a:xfrm>
-            <a:off x="12077604" y="5715000"/>
-            <a:ext cx="604256" cy="366365"/>
-          </a:xfrm>
-          <a:prstGeom prst="rect">
-            <a:avLst/>
-          </a:prstGeom>
-          <a:noFill/>
-        </p:spPr>
-        <p:txBody>
-          <a:bodyPr wrap="square" lIns="91440" tIns="45720" rIns="91440" bIns="45720" rtlCol="0">
-            <a:spAutoFit/>
-          </a:bodyPr>
-          <a:lstStyle/>
-          <a:p>
-            <a:r>
-              <a:rPr lang="en-US" sz="1800" dirty="0" smtClean="0"/>
-              <a:t>‘1’</a:t>
             </a:r>
             <a:endParaRPr lang="en-US" sz="1800" dirty="0"/>
           </a:p>
@@ -10038,7 +9781,7 @@
         </p:blipFill>
         <p:spPr bwMode="auto">
           <a:xfrm>
-            <a:off x="7594600" y="8859986"/>
+            <a:off x="7594600" y="7865100"/>
             <a:ext cx="953381" cy="766614"/>
           </a:xfrm>
           <a:prstGeom prst="rect">
@@ -10077,7 +9820,7 @@
         </p:nvSpPr>
         <p:spPr>
           <a:xfrm>
-            <a:off x="5141758" y="8248035"/>
+            <a:off x="5141758" y="7253149"/>
             <a:ext cx="1770632" cy="369332"/>
           </a:xfrm>
           <a:prstGeom prst="roundRect">
@@ -10125,7 +9868,7 @@
         </p:nvCxnSpPr>
         <p:spPr>
           <a:xfrm>
-            <a:off x="5551813" y="7694813"/>
+            <a:off x="5551813" y="6699927"/>
             <a:ext cx="35" cy="550628"/>
           </a:xfrm>
           <a:prstGeom prst="line">
@@ -10161,7 +9904,7 @@
         </p:nvCxnSpPr>
         <p:spPr>
           <a:xfrm>
-            <a:off x="6380833" y="7694813"/>
+            <a:off x="6380833" y="6699927"/>
             <a:ext cx="35" cy="550628"/>
           </a:xfrm>
           <a:prstGeom prst="line">
@@ -10197,7 +9940,7 @@
         </p:nvSpPr>
         <p:spPr>
           <a:xfrm>
-            <a:off x="6380833" y="7714456"/>
+            <a:off x="6380833" y="6719570"/>
             <a:ext cx="1537514" cy="369332"/>
           </a:xfrm>
           <a:prstGeom prst="rect">
@@ -10227,7 +9970,7 @@
         </p:nvSpPr>
         <p:spPr>
           <a:xfrm>
-            <a:off x="5245477" y="8248035"/>
+            <a:off x="5245477" y="7253149"/>
             <a:ext cx="1524000" cy="369332"/>
           </a:xfrm>
           <a:prstGeom prst="rect">
@@ -10258,7 +10001,7 @@
         </p:nvSpPr>
         <p:spPr>
           <a:xfrm>
-            <a:off x="6131170" y="8238916"/>
+            <a:off x="6131170" y="7244030"/>
             <a:ext cx="795260" cy="369332"/>
           </a:xfrm>
           <a:prstGeom prst="rect">
@@ -10291,7 +10034,7 @@
         </p:nvCxnSpPr>
         <p:spPr>
           <a:xfrm>
-            <a:off x="6926430" y="8423582"/>
+            <a:off x="6926430" y="7428696"/>
             <a:ext cx="693570" cy="600284"/>
           </a:xfrm>
           <a:prstGeom prst="bentConnector3">
@@ -10329,7 +10072,7 @@
         </p:nvSpPr>
         <p:spPr>
           <a:xfrm>
-            <a:off x="4692509" y="8915400"/>
+            <a:off x="4692509" y="7920514"/>
             <a:ext cx="1770632" cy="683918"/>
           </a:xfrm>
           <a:prstGeom prst="roundRect">
@@ -10377,7 +10120,7 @@
         </p:nvSpPr>
         <p:spPr>
           <a:xfrm>
-            <a:off x="4815825" y="9081567"/>
+            <a:off x="4815825" y="8086681"/>
             <a:ext cx="1524000" cy="369332"/>
           </a:xfrm>
           <a:prstGeom prst="rect">
@@ -10410,7 +10153,7 @@
         </p:nvCxnSpPr>
         <p:spPr>
           <a:xfrm>
-            <a:off x="4189614" y="9287579"/>
+            <a:off x="4189614" y="8292693"/>
             <a:ext cx="502222" cy="172"/>
           </a:xfrm>
           <a:prstGeom prst="line">
@@ -10446,7 +10189,7 @@
         </p:nvSpPr>
         <p:spPr>
           <a:xfrm>
-            <a:off x="4691836" y="9103085"/>
+            <a:off x="4691836" y="8108199"/>
             <a:ext cx="759542" cy="369332"/>
           </a:xfrm>
           <a:prstGeom prst="rect">
@@ -10476,7 +10219,7 @@
         </p:nvSpPr>
         <p:spPr>
           <a:xfrm>
-            <a:off x="3929638" y="8915400"/>
+            <a:off x="3929638" y="7967812"/>
             <a:ext cx="759542" cy="369332"/>
           </a:xfrm>
           <a:prstGeom prst="rect">
@@ -10493,7 +10236,7 @@
             <a:pPr algn="r"/>
             <a:r>
               <a:rPr lang="en-US" sz="1800" dirty="0" smtClean="0"/>
-              <a:t>ctrl</a:t>
+              <a:t>ready</a:t>
             </a:r>
             <a:endParaRPr lang="en-US" sz="1800" dirty="0"/>
           </a:p>
@@ -10507,7 +10250,7 @@
         </p:nvSpPr>
         <p:spPr>
           <a:xfrm>
-            <a:off x="6783526" y="8686800"/>
+            <a:off x="6783526" y="7691914"/>
             <a:ext cx="795260" cy="369332"/>
           </a:xfrm>
           <a:prstGeom prst="rect">
@@ -10538,7 +10281,7 @@
         </p:nvSpPr>
         <p:spPr>
           <a:xfrm>
-            <a:off x="6781800" y="9111734"/>
+            <a:off x="6781800" y="8116848"/>
             <a:ext cx="795260" cy="369332"/>
           </a:xfrm>
           <a:prstGeom prst="rect">
@@ -10572,7 +10315,7 @@
         </p:nvCxnSpPr>
         <p:spPr>
           <a:xfrm flipV="1">
-            <a:off x="8547981" y="9242283"/>
+            <a:off x="8547981" y="8247397"/>
             <a:ext cx="369505" cy="1010"/>
           </a:xfrm>
           <a:prstGeom prst="line">
@@ -10608,7 +10351,7 @@
         </p:nvSpPr>
         <p:spPr>
           <a:xfrm>
-            <a:off x="8917486" y="9057617"/>
+            <a:off x="8917486" y="8062731"/>
             <a:ext cx="455114" cy="369332"/>
           </a:xfrm>
           <a:prstGeom prst="rect">
@@ -10638,7 +10381,7 @@
         </p:nvSpPr>
         <p:spPr>
           <a:xfrm>
-            <a:off x="5141758" y="9889826"/>
+            <a:off x="5141758" y="8894940"/>
             <a:ext cx="1770632" cy="369332"/>
           </a:xfrm>
           <a:prstGeom prst="roundRect">
@@ -10686,7 +10429,7 @@
         </p:nvCxnSpPr>
         <p:spPr>
           <a:xfrm>
-            <a:off x="6584915" y="9336604"/>
+            <a:off x="6584915" y="8341718"/>
             <a:ext cx="35" cy="550628"/>
           </a:xfrm>
           <a:prstGeom prst="line">
@@ -10722,7 +10465,7 @@
         </p:nvSpPr>
         <p:spPr>
           <a:xfrm>
-            <a:off x="5245477" y="9889826"/>
+            <a:off x="5245477" y="8894940"/>
             <a:ext cx="1524000" cy="369332"/>
           </a:xfrm>
           <a:prstGeom prst="rect">
@@ -10753,7 +10496,7 @@
         </p:nvSpPr>
         <p:spPr>
           <a:xfrm>
-            <a:off x="6131170" y="9880707"/>
+            <a:off x="6131170" y="8885821"/>
             <a:ext cx="795260" cy="369332"/>
           </a:xfrm>
           <a:prstGeom prst="rect">
@@ -10786,7 +10529,7 @@
         </p:nvCxnSpPr>
         <p:spPr>
           <a:xfrm flipV="1">
-            <a:off x="6926430" y="9476299"/>
+            <a:off x="6926430" y="8481413"/>
             <a:ext cx="693570" cy="589074"/>
           </a:xfrm>
           <a:prstGeom prst="bentConnector3">
@@ -10826,7 +10569,7 @@
         </p:nvCxnSpPr>
         <p:spPr>
           <a:xfrm>
-            <a:off x="5577825" y="8596152"/>
+            <a:off x="5577825" y="7601266"/>
             <a:ext cx="0" cy="319248"/>
           </a:xfrm>
           <a:prstGeom prst="line">
@@ -10862,7 +10605,7 @@
         </p:nvCxnSpPr>
         <p:spPr>
           <a:xfrm>
-            <a:off x="5575300" y="9572238"/>
+            <a:off x="5575300" y="8577352"/>
             <a:ext cx="0" cy="319248"/>
           </a:xfrm>
           <a:prstGeom prst="line">
@@ -10898,7 +10641,7 @@
         </p:nvCxnSpPr>
         <p:spPr>
           <a:xfrm rot="16200000" flipH="1">
-            <a:off x="5809636" y="8604020"/>
+            <a:off x="5815986" y="7609134"/>
             <a:ext cx="1339811" cy="197346"/>
           </a:xfrm>
           <a:prstGeom prst="bentConnector3">
@@ -10935,7 +10678,7 @@
         </p:nvSpPr>
         <p:spPr>
           <a:xfrm>
-            <a:off x="5177670" y="8899213"/>
+            <a:off x="5177670" y="7904327"/>
             <a:ext cx="795260" cy="369332"/>
           </a:xfrm>
           <a:prstGeom prst="rect">
@@ -10954,7 +10697,6 @@
               <a:rPr lang="en-US" sz="1800" dirty="0"/>
               <a:t>D</a:t>
             </a:r>
-            <a:endParaRPr lang="en-US" sz="1800" dirty="0"/>
           </a:p>
         </p:txBody>
       </p:sp>
@@ -10966,7 +10708,7 @@
         </p:nvSpPr>
         <p:spPr>
           <a:xfrm>
-            <a:off x="5181600" y="9289924"/>
+            <a:off x="5181600" y="8295038"/>
             <a:ext cx="795260" cy="369332"/>
           </a:xfrm>
           <a:prstGeom prst="rect">
@@ -10997,7 +10739,7 @@
         </p:nvSpPr>
         <p:spPr>
           <a:xfrm>
-            <a:off x="5334000" y="8546068"/>
+            <a:off x="5334000" y="7551182"/>
             <a:ext cx="795260" cy="369332"/>
           </a:xfrm>
           <a:prstGeom prst="rect">
@@ -11016,7 +10758,6 @@
               <a:rPr lang="en-US" sz="1800" dirty="0"/>
               <a:t>D</a:t>
             </a:r>
-            <a:endParaRPr lang="en-US" sz="1800" dirty="0"/>
           </a:p>
         </p:txBody>
       </p:sp>
@@ -11028,7 +10769,7 @@
         </p:nvSpPr>
         <p:spPr>
           <a:xfrm>
-            <a:off x="5348514" y="9539514"/>
+            <a:off x="5348514" y="8544628"/>
             <a:ext cx="795260" cy="369332"/>
           </a:xfrm>
           <a:prstGeom prst="rect">
@@ -11059,7 +10800,7 @@
         </p:nvSpPr>
         <p:spPr>
           <a:xfrm rot="16200000">
-            <a:off x="5944123" y="6258358"/>
+            <a:off x="5944123" y="5263472"/>
             <a:ext cx="1770632" cy="683918"/>
           </a:xfrm>
           <a:prstGeom prst="roundRect">
@@ -11107,7 +10848,7 @@
         </p:nvSpPr>
         <p:spPr>
           <a:xfrm>
-            <a:off x="6501684" y="5726842"/>
+            <a:off x="6501684" y="4731956"/>
             <a:ext cx="658657" cy="369332"/>
           </a:xfrm>
           <a:prstGeom prst="rect">
@@ -11138,7 +10879,7 @@
         </p:nvSpPr>
         <p:spPr>
           <a:xfrm>
-            <a:off x="6203082" y="6421363"/>
+            <a:off x="6203082" y="5426477"/>
             <a:ext cx="795260" cy="369332"/>
           </a:xfrm>
           <a:prstGeom prst="rect">
@@ -11157,7 +10898,6 @@
               <a:rPr lang="en-US" sz="1800" dirty="0"/>
               <a:t>D</a:t>
             </a:r>
-            <a:endParaRPr lang="en-US" sz="1800" dirty="0"/>
           </a:p>
         </p:txBody>
       </p:sp>
@@ -11169,7 +10909,7 @@
         </p:nvSpPr>
         <p:spPr>
           <a:xfrm>
-            <a:off x="6656710" y="6407545"/>
+            <a:off x="6656710" y="5412659"/>
             <a:ext cx="795260" cy="369332"/>
           </a:xfrm>
           <a:prstGeom prst="rect">
@@ -11200,7 +10940,7 @@
         </p:nvSpPr>
         <p:spPr>
           <a:xfrm rot="16200000">
-            <a:off x="6036833" y="6421364"/>
+            <a:off x="6036833" y="5426478"/>
             <a:ext cx="1524000" cy="369332"/>
           </a:xfrm>
           <a:prstGeom prst="rect">
@@ -11231,7 +10971,7 @@
         </p:nvCxnSpPr>
         <p:spPr>
           <a:xfrm flipV="1">
-            <a:off x="5994308" y="6592211"/>
+            <a:off x="5994308" y="5597325"/>
             <a:ext cx="482692" cy="2967"/>
           </a:xfrm>
           <a:prstGeom prst="line">
@@ -11267,7 +11007,7 @@
         </p:nvCxnSpPr>
         <p:spPr>
           <a:xfrm>
-            <a:off x="6831012" y="5377934"/>
+            <a:off x="6831012" y="4383048"/>
             <a:ext cx="0" cy="322535"/>
           </a:xfrm>
           <a:prstGeom prst="line">
@@ -11303,8 +11043,8 @@
         </p:nvSpPr>
         <p:spPr>
           <a:xfrm>
-            <a:off x="6501684" y="5001156"/>
-            <a:ext cx="658657" cy="369332"/>
+            <a:off x="6388810" y="4006270"/>
+            <a:ext cx="884406" cy="369332"/>
           </a:xfrm>
           <a:prstGeom prst="rect">
             <a:avLst/>
@@ -11319,8 +11059,8 @@
           <a:p>
             <a:pPr algn="ctr"/>
             <a:r>
-              <a:rPr lang="en-US" sz="1800" dirty="0" err="1" smtClean="0"/>
-              <a:t>clk</a:t>
+              <a:rPr lang="en-US" sz="1800" dirty="0" smtClean="0"/>
+              <a:t>ready</a:t>
             </a:r>
             <a:endParaRPr lang="en-US" sz="1800" dirty="0"/>
           </a:p>
@@ -11334,7 +11074,7 @@
         </p:nvSpPr>
         <p:spPr>
           <a:xfrm rot="16200000">
-            <a:off x="7134289" y="6258358"/>
+            <a:off x="7134289" y="5263472"/>
             <a:ext cx="1770632" cy="683918"/>
           </a:xfrm>
           <a:prstGeom prst="roundRect">
@@ -11382,7 +11122,7 @@
         </p:nvSpPr>
         <p:spPr>
           <a:xfrm>
-            <a:off x="7691850" y="5726842"/>
+            <a:off x="7691850" y="4731956"/>
             <a:ext cx="658657" cy="369332"/>
           </a:xfrm>
           <a:prstGeom prst="rect">
@@ -11413,7 +11153,7 @@
         </p:nvSpPr>
         <p:spPr>
           <a:xfrm rot="16200000">
-            <a:off x="7226999" y="6421364"/>
+            <a:off x="7226999" y="5426478"/>
             <a:ext cx="1524000" cy="369332"/>
           </a:xfrm>
           <a:prstGeom prst="rect">
@@ -11444,7 +11184,7 @@
         </p:nvCxnSpPr>
         <p:spPr>
           <a:xfrm flipV="1">
-            <a:off x="7184474" y="6592211"/>
+            <a:off x="7184474" y="5597325"/>
             <a:ext cx="482692" cy="2967"/>
           </a:xfrm>
           <a:prstGeom prst="line">
@@ -11480,7 +11220,7 @@
         </p:nvSpPr>
         <p:spPr>
           <a:xfrm rot="5400000">
-            <a:off x="8497457" y="6332891"/>
+            <a:off x="8497457" y="5338005"/>
             <a:ext cx="1224663" cy="571266"/>
           </a:xfrm>
           <a:prstGeom prst="trapezoid">
@@ -11528,7 +11268,7 @@
         </p:nvSpPr>
         <p:spPr>
           <a:xfrm rot="16200000">
-            <a:off x="8612975" y="6417823"/>
+            <a:off x="8612975" y="5422937"/>
             <a:ext cx="1071637" cy="369332"/>
           </a:xfrm>
           <a:prstGeom prst="rect">
@@ -11561,7 +11301,7 @@
         </p:nvCxnSpPr>
         <p:spPr>
           <a:xfrm flipV="1">
-            <a:off x="9372009" y="6657105"/>
+            <a:off x="9372009" y="5662219"/>
             <a:ext cx="482692" cy="2967"/>
           </a:xfrm>
           <a:prstGeom prst="line">
@@ -11597,7 +11337,7 @@
         </p:nvSpPr>
         <p:spPr>
           <a:xfrm>
-            <a:off x="9854701" y="6472439"/>
+            <a:off x="9854701" y="5477553"/>
             <a:ext cx="1338711" cy="369332"/>
           </a:xfrm>
           <a:prstGeom prst="rect">
@@ -11627,7 +11367,7 @@
         </p:nvCxnSpPr>
         <p:spPr>
           <a:xfrm rot="16200000" flipH="1">
-            <a:off x="8259925" y="5836566"/>
+            <a:off x="8259925" y="4841680"/>
             <a:ext cx="879891" cy="248574"/>
           </a:xfrm>
           <a:prstGeom prst="bentConnector3">
@@ -11665,7 +11405,7 @@
         </p:nvSpPr>
         <p:spPr>
           <a:xfrm>
-            <a:off x="8765181" y="6662058"/>
+            <a:off x="8765181" y="5667172"/>
             <a:ext cx="419578" cy="369332"/>
           </a:xfrm>
           <a:prstGeom prst="rect">
@@ -11696,7 +11436,7 @@
         </p:nvCxnSpPr>
         <p:spPr>
           <a:xfrm flipV="1">
-            <a:off x="8334235" y="6838804"/>
+            <a:off x="8334235" y="5843918"/>
             <a:ext cx="482692" cy="2967"/>
           </a:xfrm>
           <a:prstGeom prst="line">
@@ -11732,7 +11472,7 @@
         </p:nvSpPr>
         <p:spPr>
           <a:xfrm>
-            <a:off x="8777514" y="6215742"/>
+            <a:off x="8761748" y="5220856"/>
             <a:ext cx="419578" cy="369332"/>
           </a:xfrm>
           <a:prstGeom prst="rect">
@@ -11751,7 +11491,6 @@
               <a:rPr lang="en-US" sz="1800" dirty="0"/>
               <a:t>1</a:t>
             </a:r>
-            <a:endParaRPr lang="en-US" sz="1800" dirty="0"/>
           </a:p>
         </p:txBody>
       </p:sp>
@@ -11763,7 +11502,7 @@
         </p:nvSpPr>
         <p:spPr>
           <a:xfrm>
-            <a:off x="7806824" y="5181600"/>
+            <a:off x="7806824" y="4186714"/>
             <a:ext cx="1537514" cy="369332"/>
           </a:xfrm>
           <a:prstGeom prst="rect">
@@ -11794,7 +11533,7 @@
         </p:nvCxnSpPr>
         <p:spPr>
           <a:xfrm>
-            <a:off x="9119471" y="5729828"/>
+            <a:off x="9119471" y="4734942"/>
             <a:ext cx="0" cy="322535"/>
           </a:xfrm>
           <a:prstGeom prst="line">
@@ -11830,7 +11569,7 @@
         </p:nvSpPr>
         <p:spPr>
           <a:xfrm>
-            <a:off x="8676663" y="5353050"/>
+            <a:off x="8676663" y="4358164"/>
             <a:ext cx="885618" cy="369332"/>
           </a:xfrm>
           <a:prstGeom prst="rect">
@@ -11861,7 +11600,7 @@
         </p:nvCxnSpPr>
         <p:spPr>
           <a:xfrm flipV="1">
-            <a:off x="5551849" y="7239000"/>
+            <a:off x="5551849" y="6244114"/>
             <a:ext cx="911292" cy="527962"/>
           </a:xfrm>
           <a:prstGeom prst="bentConnector3">
@@ -11898,7 +11637,7 @@
         </p:nvCxnSpPr>
         <p:spPr>
           <a:xfrm>
-            <a:off x="7187661" y="7234348"/>
+            <a:off x="7187661" y="6239462"/>
             <a:ext cx="489985" cy="0"/>
           </a:xfrm>
           <a:prstGeom prst="line">
@@ -11934,7 +11673,7 @@
         </p:nvCxnSpPr>
         <p:spPr>
           <a:xfrm>
-            <a:off x="8350507" y="7229696"/>
+            <a:off x="8350507" y="6234810"/>
             <a:ext cx="225074" cy="2326"/>
           </a:xfrm>
           <a:prstGeom prst="line">
@@ -11970,7 +11709,7 @@
         </p:nvCxnSpPr>
         <p:spPr>
           <a:xfrm>
-            <a:off x="7691850" y="7234348"/>
+            <a:off x="7691850" y="6239462"/>
             <a:ext cx="669715" cy="0"/>
           </a:xfrm>
           <a:prstGeom prst="line">
@@ -12007,7 +11746,7 @@
         </p:nvCxnSpPr>
         <p:spPr>
           <a:xfrm>
-            <a:off x="8547981" y="6838804"/>
+            <a:off x="8547981" y="5843918"/>
             <a:ext cx="0" cy="392055"/>
           </a:xfrm>
           <a:prstGeom prst="line">
@@ -12035,101 +11774,6 @@
           </a:fontRef>
         </p:style>
       </p:cxnSp>
-      <p:sp>
-        <p:nvSpPr>
-          <p:cNvPr id="486" name="TextBox 485"/>
-          <p:cNvSpPr txBox="1"/>
-          <p:nvPr/>
-        </p:nvSpPr>
-        <p:spPr>
-          <a:xfrm>
-            <a:off x="8308481" y="2889041"/>
-            <a:ext cx="570681" cy="369332"/>
-          </a:xfrm>
-          <a:prstGeom prst="rect">
-            <a:avLst/>
-          </a:prstGeom>
-          <a:noFill/>
-        </p:spPr>
-        <p:txBody>
-          <a:bodyPr wrap="square" lIns="91440" tIns="45720" rIns="91440" bIns="45720" rtlCol="0">
-            <a:spAutoFit/>
-          </a:bodyPr>
-          <a:lstStyle/>
-          <a:p>
-            <a:r>
-              <a:rPr lang="en-US" sz="1800" dirty="0" smtClean="0"/>
-              <a:t>10</a:t>
-            </a:r>
-            <a:endParaRPr lang="en-US" sz="1800" dirty="0"/>
-          </a:p>
-        </p:txBody>
-      </p:sp>
-      <p:cxnSp>
-        <p:nvCxnSpPr>
-          <p:cNvPr id="487" name="Straight Connector 486"/>
-          <p:cNvCxnSpPr/>
-          <p:nvPr/>
-        </p:nvCxnSpPr>
-        <p:spPr>
-          <a:xfrm flipV="1">
-            <a:off x="8136735" y="2724972"/>
-            <a:ext cx="323623" cy="304800"/>
-          </a:xfrm>
-          <a:prstGeom prst="line">
-            <a:avLst/>
-          </a:prstGeom>
-          <a:ln w="12700">
-            <a:solidFill>
-              <a:schemeClr val="tx1"/>
-            </a:solidFill>
-          </a:ln>
-        </p:spPr>
-        <p:style>
-          <a:lnRef idx="1">
-            <a:schemeClr val="accent1"/>
-          </a:lnRef>
-          <a:fillRef idx="0">
-            <a:schemeClr val="accent1"/>
-          </a:fillRef>
-          <a:effectRef idx="0">
-            <a:schemeClr val="accent1"/>
-          </a:effectRef>
-          <a:fontRef idx="minor">
-            <a:schemeClr val="tx1"/>
-          </a:fontRef>
-        </p:style>
-      </p:cxnSp>
-      <p:sp>
-        <p:nvSpPr>
-          <p:cNvPr id="488" name="TextBox 487"/>
-          <p:cNvSpPr txBox="1"/>
-          <p:nvPr/>
-        </p:nvSpPr>
-        <p:spPr>
-          <a:xfrm>
-            <a:off x="6911851" y="3556000"/>
-            <a:ext cx="570681" cy="369332"/>
-          </a:xfrm>
-          <a:prstGeom prst="rect">
-            <a:avLst/>
-          </a:prstGeom>
-          <a:noFill/>
-        </p:spPr>
-        <p:txBody>
-          <a:bodyPr wrap="square" lIns="91440" tIns="45720" rIns="91440" bIns="45720" rtlCol="0">
-            <a:spAutoFit/>
-          </a:bodyPr>
-          <a:lstStyle/>
-          <a:p>
-            <a:r>
-              <a:rPr lang="en-US" sz="1800" dirty="0" smtClean="0"/>
-              <a:t>10</a:t>
-            </a:r>
-            <a:endParaRPr lang="en-US" sz="1800" dirty="0"/>
-          </a:p>
-        </p:txBody>
-      </p:sp>
       <p:cxnSp>
         <p:nvCxnSpPr>
           <p:cNvPr id="489" name="Straight Connector 488"/>
@@ -12138,73 +11782,7 @@
         </p:nvCxnSpPr>
         <p:spPr>
           <a:xfrm flipV="1">
-            <a:off x="6705600" y="3629828"/>
-            <a:ext cx="264757" cy="230972"/>
-          </a:xfrm>
-          <a:prstGeom prst="line">
-            <a:avLst/>
-          </a:prstGeom>
-          <a:ln w="12700">
-            <a:solidFill>
-              <a:schemeClr val="tx1"/>
-            </a:solidFill>
-          </a:ln>
-        </p:spPr>
-        <p:style>
-          <a:lnRef idx="1">
-            <a:schemeClr val="accent1"/>
-          </a:lnRef>
-          <a:fillRef idx="0">
-            <a:schemeClr val="accent1"/>
-          </a:fillRef>
-          <a:effectRef idx="0">
-            <a:schemeClr val="accent1"/>
-          </a:effectRef>
-          <a:fontRef idx="minor">
-            <a:schemeClr val="tx1"/>
-          </a:fontRef>
-        </p:style>
-      </p:cxnSp>
-      <p:sp>
-        <p:nvSpPr>
-          <p:cNvPr id="491" name="TextBox 490"/>
-          <p:cNvSpPr txBox="1"/>
-          <p:nvPr/>
-        </p:nvSpPr>
-        <p:spPr>
-          <a:xfrm>
-            <a:off x="4800600" y="3708400"/>
-            <a:ext cx="479840" cy="369332"/>
-          </a:xfrm>
-          <a:prstGeom prst="rect">
-            <a:avLst/>
-          </a:prstGeom>
-          <a:noFill/>
-        </p:spPr>
-        <p:txBody>
-          <a:bodyPr wrap="square" lIns="91440" tIns="45720" rIns="91440" bIns="45720" rtlCol="0">
-            <a:spAutoFit/>
-          </a:bodyPr>
-          <a:lstStyle/>
-          <a:p>
-            <a:pPr algn="r"/>
-            <a:r>
-              <a:rPr lang="en-US" sz="1800" dirty="0" smtClean="0"/>
-              <a:t>10</a:t>
-            </a:r>
-            <a:endParaRPr lang="en-US" sz="1800" dirty="0"/>
-          </a:p>
-        </p:txBody>
-      </p:sp>
-      <p:cxnSp>
-        <p:nvCxnSpPr>
-          <p:cNvPr id="492" name="Straight Connector 491"/>
-          <p:cNvCxnSpPr/>
-          <p:nvPr/>
-        </p:nvCxnSpPr>
-        <p:spPr>
-          <a:xfrm flipV="1">
-            <a:off x="5167202" y="3782228"/>
+            <a:off x="6705600" y="2634942"/>
             <a:ext cx="264757" cy="230972"/>
           </a:xfrm>
           <a:prstGeom prst="line">
@@ -12241,7 +11819,7 @@
         </p:nvCxnSpPr>
         <p:spPr>
           <a:xfrm>
-            <a:off x="7918347" y="5179524"/>
+            <a:off x="7918347" y="4184638"/>
             <a:ext cx="1914339" cy="493782"/>
           </a:xfrm>
           <a:prstGeom prst="bentConnector3">
@@ -12279,7 +11857,7 @@
         </p:nvSpPr>
         <p:spPr>
           <a:xfrm>
-            <a:off x="9832686" y="5488640"/>
+            <a:off x="9832686" y="4493754"/>
             <a:ext cx="1294050" cy="369332"/>
           </a:xfrm>
           <a:prstGeom prst="rect">
@@ -12312,7 +11890,7 @@
         </p:nvCxnSpPr>
         <p:spPr>
           <a:xfrm>
-            <a:off x="14223087" y="6028523"/>
+            <a:off x="14223087" y="5033637"/>
             <a:ext cx="482693" cy="0"/>
           </a:xfrm>
           <a:prstGeom prst="line">
@@ -12348,7 +11926,7 @@
         </p:nvSpPr>
         <p:spPr>
           <a:xfrm>
-            <a:off x="13427827" y="5843857"/>
+            <a:off x="13427827" y="4848971"/>
             <a:ext cx="795260" cy="369332"/>
           </a:xfrm>
           <a:prstGeom prst="rect">
@@ -12379,7 +11957,7 @@
         </p:nvSpPr>
         <p:spPr>
           <a:xfrm>
-            <a:off x="14705780" y="5843857"/>
+            <a:off x="14705780" y="4848971"/>
             <a:ext cx="533400" cy="369332"/>
           </a:xfrm>
           <a:prstGeom prst="rect">
@@ -12412,7 +11990,7 @@
         </p:nvCxnSpPr>
         <p:spPr>
           <a:xfrm>
-            <a:off x="14231860" y="5696466"/>
+            <a:off x="14231860" y="4701580"/>
             <a:ext cx="482693" cy="0"/>
           </a:xfrm>
           <a:prstGeom prst="line">
@@ -12448,7 +12026,7 @@
         </p:nvSpPr>
         <p:spPr>
           <a:xfrm>
-            <a:off x="13436600" y="5511800"/>
+            <a:off x="13436600" y="4516914"/>
             <a:ext cx="795260" cy="369332"/>
           </a:xfrm>
           <a:prstGeom prst="rect">
@@ -12479,7 +12057,7 @@
         </p:nvSpPr>
         <p:spPr>
           <a:xfrm>
-            <a:off x="14714553" y="5511800"/>
+            <a:off x="14714553" y="4516914"/>
             <a:ext cx="533400" cy="369332"/>
           </a:xfrm>
           <a:prstGeom prst="rect">
@@ -12512,7 +12090,7 @@
         </p:nvCxnSpPr>
         <p:spPr>
           <a:xfrm>
-            <a:off x="14205126" y="8884166"/>
+            <a:off x="14205126" y="7889280"/>
             <a:ext cx="482693" cy="0"/>
           </a:xfrm>
           <a:prstGeom prst="line">
@@ -12548,7 +12126,7 @@
         </p:nvSpPr>
         <p:spPr>
           <a:xfrm>
-            <a:off x="13834230" y="8699500"/>
+            <a:off x="13834230" y="7704614"/>
             <a:ext cx="370896" cy="369332"/>
           </a:xfrm>
           <a:prstGeom prst="rect">
@@ -12579,7 +12157,7 @@
         </p:nvSpPr>
         <p:spPr>
           <a:xfrm>
-            <a:off x="14687819" y="8699500"/>
+            <a:off x="14687819" y="7704614"/>
             <a:ext cx="533400" cy="369332"/>
           </a:xfrm>
           <a:prstGeom prst="rect">
@@ -12609,7 +12187,7 @@
         </p:nvSpPr>
         <p:spPr>
           <a:xfrm>
-            <a:off x="12381069" y="7962779"/>
+            <a:off x="12381069" y="6967893"/>
             <a:ext cx="460061" cy="369332"/>
           </a:xfrm>
           <a:prstGeom prst="rect">
@@ -12640,7 +12218,7 @@
         </p:nvCxnSpPr>
         <p:spPr>
           <a:xfrm flipV="1">
-            <a:off x="12708752" y="8036607"/>
+            <a:off x="12708752" y="7041721"/>
             <a:ext cx="264757" cy="230972"/>
           </a:xfrm>
           <a:prstGeom prst="line">
@@ -12675,7 +12253,7 @@
         </p:nvSpPr>
         <p:spPr>
           <a:xfrm>
-            <a:off x="13309600" y="7962900"/>
+            <a:off x="13309600" y="6968014"/>
             <a:ext cx="460061" cy="369332"/>
           </a:xfrm>
           <a:prstGeom prst="rect">
@@ -12706,7 +12284,7 @@
         </p:nvCxnSpPr>
         <p:spPr>
           <a:xfrm flipV="1">
-            <a:off x="13637283" y="8036728"/>
+            <a:off x="13637283" y="7041842"/>
             <a:ext cx="264757" cy="230972"/>
           </a:xfrm>
           <a:prstGeom prst="line">
@@ -12741,7 +12319,7 @@
         </p:nvSpPr>
         <p:spPr>
           <a:xfrm>
-            <a:off x="4495800" y="6864225"/>
+            <a:off x="4495800" y="5869339"/>
             <a:ext cx="570681" cy="369332"/>
           </a:xfrm>
           <a:prstGeom prst="rect">
@@ -12771,7 +12349,7 @@
         </p:nvCxnSpPr>
         <p:spPr>
           <a:xfrm flipV="1">
-            <a:off x="4381259" y="6776356"/>
+            <a:off x="4381259" y="5781470"/>
             <a:ext cx="323623" cy="304800"/>
           </a:xfrm>
           <a:prstGeom prst="line">
@@ -12806,7 +12384,7 @@
         </p:nvSpPr>
         <p:spPr>
           <a:xfrm>
-            <a:off x="4521496" y="6553200"/>
+            <a:off x="4521496" y="5558314"/>
             <a:ext cx="570681" cy="369332"/>
           </a:xfrm>
           <a:prstGeom prst="rect">
@@ -12836,7 +12414,7 @@
         </p:nvCxnSpPr>
         <p:spPr>
           <a:xfrm flipV="1">
-            <a:off x="4406955" y="6465331"/>
+            <a:off x="4406955" y="5470445"/>
             <a:ext cx="323623" cy="304800"/>
           </a:xfrm>
           <a:prstGeom prst="line">
@@ -12871,7 +12449,7 @@
         </p:nvSpPr>
         <p:spPr>
           <a:xfrm>
-            <a:off x="4534141" y="6242751"/>
+            <a:off x="4534141" y="5247865"/>
             <a:ext cx="570681" cy="369332"/>
           </a:xfrm>
           <a:prstGeom prst="rect">
@@ -12901,7 +12479,7 @@
         </p:nvCxnSpPr>
         <p:spPr>
           <a:xfrm flipV="1">
-            <a:off x="4419600" y="6154882"/>
+            <a:off x="4419600" y="5159996"/>
             <a:ext cx="323623" cy="304800"/>
           </a:xfrm>
           <a:prstGeom prst="line">
@@ -12936,7 +12514,7 @@
         </p:nvSpPr>
         <p:spPr>
           <a:xfrm>
-            <a:off x="4559837" y="5931726"/>
+            <a:off x="4559837" y="4936840"/>
             <a:ext cx="570681" cy="369332"/>
           </a:xfrm>
           <a:prstGeom prst="rect">
@@ -12966,7 +12544,7 @@
         </p:nvCxnSpPr>
         <p:spPr>
           <a:xfrm flipV="1">
-            <a:off x="4445296" y="5843857"/>
+            <a:off x="4445296" y="4848971"/>
             <a:ext cx="323623" cy="304800"/>
           </a:xfrm>
           <a:prstGeom prst="line">
@@ -12993,174 +12571,6 @@
           </a:fontRef>
         </p:style>
       </p:cxnSp>
-      <p:cxnSp>
-        <p:nvCxnSpPr>
-          <p:cNvPr id="524" name="Straight Connector 523"/>
-          <p:cNvCxnSpPr>
-            <a:stCxn id="525" idx="2"/>
-          </p:cNvCxnSpPr>
-          <p:nvPr/>
-        </p:nvCxnSpPr>
-        <p:spPr>
-          <a:xfrm flipH="1">
-            <a:off x="10142896" y="1828800"/>
-            <a:ext cx="11991" cy="1219200"/>
-          </a:xfrm>
-          <a:prstGeom prst="line">
-            <a:avLst/>
-          </a:prstGeom>
-          <a:ln w="12700">
-            <a:solidFill>
-              <a:schemeClr val="tx1"/>
-            </a:solidFill>
-            <a:tailEnd type="triangle"/>
-          </a:ln>
-        </p:spPr>
-        <p:style>
-          <a:lnRef idx="1">
-            <a:schemeClr val="accent1"/>
-          </a:lnRef>
-          <a:fillRef idx="0">
-            <a:schemeClr val="accent1"/>
-          </a:fillRef>
-          <a:effectRef idx="0">
-            <a:schemeClr val="accent1"/>
-          </a:effectRef>
-          <a:fontRef idx="minor">
-            <a:schemeClr val="tx1"/>
-          </a:fontRef>
-        </p:style>
-      </p:cxnSp>
-      <p:sp>
-        <p:nvSpPr>
-          <p:cNvPr id="525" name="TextBox 524"/>
-          <p:cNvSpPr txBox="1"/>
-          <p:nvPr/>
-        </p:nvSpPr>
-        <p:spPr>
-          <a:xfrm>
-            <a:off x="9712078" y="1459468"/>
-            <a:ext cx="885618" cy="369332"/>
-          </a:xfrm>
-          <a:prstGeom prst="rect">
-            <a:avLst/>
-          </a:prstGeom>
-          <a:noFill/>
-        </p:spPr>
-        <p:txBody>
-          <a:bodyPr wrap="square" lIns="91440" tIns="45720" rIns="91440" bIns="45720" rtlCol="0">
-            <a:spAutoFit/>
-          </a:bodyPr>
-          <a:lstStyle/>
-          <a:p>
-            <a:pPr algn="ctr"/>
-            <a:r>
-              <a:rPr lang="en-US" sz="1800" dirty="0" err="1" smtClean="0"/>
-              <a:t>exSel</a:t>
-            </a:r>
-            <a:endParaRPr lang="en-US" sz="1800" dirty="0"/>
-          </a:p>
-        </p:txBody>
-      </p:sp>
-      <p:cxnSp>
-        <p:nvCxnSpPr>
-          <p:cNvPr id="526" name="Straight Connector 525"/>
-          <p:cNvCxnSpPr>
-            <a:stCxn id="527" idx="2"/>
-          </p:cNvCxnSpPr>
-          <p:nvPr/>
-        </p:nvCxnSpPr>
-        <p:spPr>
-          <a:xfrm>
-            <a:off x="9261248" y="1828800"/>
-            <a:ext cx="0" cy="1190501"/>
-          </a:xfrm>
-          <a:prstGeom prst="line">
-            <a:avLst/>
-          </a:prstGeom>
-          <a:ln w="12700">
-            <a:solidFill>
-              <a:schemeClr val="tx1"/>
-            </a:solidFill>
-            <a:tailEnd type="triangle"/>
-          </a:ln>
-        </p:spPr>
-        <p:style>
-          <a:lnRef idx="1">
-            <a:schemeClr val="accent1"/>
-          </a:lnRef>
-          <a:fillRef idx="0">
-            <a:schemeClr val="accent1"/>
-          </a:fillRef>
-          <a:effectRef idx="0">
-            <a:schemeClr val="accent1"/>
-          </a:effectRef>
-          <a:fontRef idx="minor">
-            <a:schemeClr val="tx1"/>
-          </a:fontRef>
-        </p:style>
-      </p:cxnSp>
-      <p:sp>
-        <p:nvSpPr>
-          <p:cNvPr id="527" name="TextBox 526"/>
-          <p:cNvSpPr txBox="1"/>
-          <p:nvPr/>
-        </p:nvSpPr>
-        <p:spPr>
-          <a:xfrm>
-            <a:off x="8686800" y="1459468"/>
-            <a:ext cx="1148896" cy="369332"/>
-          </a:xfrm>
-          <a:prstGeom prst="rect">
-            <a:avLst/>
-          </a:prstGeom>
-          <a:noFill/>
-        </p:spPr>
-        <p:txBody>
-          <a:bodyPr wrap="square" lIns="91440" tIns="45720" rIns="91440" bIns="45720" rtlCol="0">
-            <a:spAutoFit/>
-          </a:bodyPr>
-          <a:lstStyle/>
-          <a:p>
-            <a:pPr algn="ctr"/>
-            <a:r>
-              <a:rPr lang="en-US" sz="1800" dirty="0" err="1" smtClean="0"/>
-              <a:t>exWen</a:t>
-            </a:r>
-            <a:endParaRPr lang="en-US" sz="1800" dirty="0"/>
-          </a:p>
-        </p:txBody>
-      </p:sp>
-      <p:sp>
-        <p:nvSpPr>
-          <p:cNvPr id="528" name="TextBox 527"/>
-          <p:cNvSpPr txBox="1"/>
-          <p:nvPr/>
-        </p:nvSpPr>
-        <p:spPr>
-          <a:xfrm>
-            <a:off x="7748575" y="1452086"/>
-            <a:ext cx="1148896" cy="369332"/>
-          </a:xfrm>
-          <a:prstGeom prst="rect">
-            <a:avLst/>
-          </a:prstGeom>
-          <a:noFill/>
-        </p:spPr>
-        <p:txBody>
-          <a:bodyPr wrap="square" lIns="91440" tIns="45720" rIns="91440" bIns="45720" rtlCol="0">
-            <a:spAutoFit/>
-          </a:bodyPr>
-          <a:lstStyle/>
-          <a:p>
-            <a:r>
-              <a:rPr lang="en-US" sz="1800" dirty="0" err="1" smtClean="0"/>
-              <a:t>exWrAddr</a:t>
-            </a:r>
-            <a:endParaRPr lang="en-US" sz="1800" dirty="0"/>
-          </a:p>
-        </p:txBody>
-      </p:sp>
       <p:sp>
         <p:nvSpPr>
           <p:cNvPr id="531" name="TextBox 530"/>
@@ -13169,7 +12579,7 @@
         </p:nvSpPr>
         <p:spPr>
           <a:xfrm>
-            <a:off x="9170546" y="4393168"/>
+            <a:off x="9170546" y="3398282"/>
             <a:ext cx="885618" cy="369332"/>
           </a:xfrm>
           <a:prstGeom prst="rect">
@@ -13203,7 +12613,7 @@
         </p:nvCxnSpPr>
         <p:spPr>
           <a:xfrm flipH="1">
-            <a:off x="8682812" y="4577834"/>
+            <a:off x="8682812" y="3582948"/>
             <a:ext cx="487734" cy="4006"/>
           </a:xfrm>
           <a:prstGeom prst="line">
@@ -13239,7 +12649,7 @@
         </p:nvCxnSpPr>
         <p:spPr>
           <a:xfrm flipV="1">
-            <a:off x="7924800" y="4935712"/>
+            <a:off x="7924800" y="3940826"/>
             <a:ext cx="0" cy="250110"/>
           </a:xfrm>
           <a:prstGeom prst="line">
@@ -13277,7 +12687,7 @@
         </p:nvCxnSpPr>
         <p:spPr>
           <a:xfrm>
-            <a:off x="9374862" y="8477250"/>
+            <a:off x="9374862" y="7482364"/>
             <a:ext cx="482693" cy="0"/>
           </a:xfrm>
           <a:prstGeom prst="line">
@@ -13313,7 +12723,7 @@
         </p:nvSpPr>
         <p:spPr>
           <a:xfrm>
-            <a:off x="9857555" y="8292584"/>
+            <a:off x="9857555" y="7297698"/>
             <a:ext cx="940186" cy="369332"/>
           </a:xfrm>
           <a:prstGeom prst="rect">
@@ -13343,7 +12753,7 @@
         </p:nvSpPr>
         <p:spPr>
           <a:xfrm rot="5400000">
-            <a:off x="8534477" y="8175759"/>
+            <a:off x="8534477" y="7180873"/>
             <a:ext cx="1224663" cy="571266"/>
           </a:xfrm>
           <a:prstGeom prst="trapezoid">
@@ -13391,7 +12801,7 @@
         </p:nvSpPr>
         <p:spPr>
           <a:xfrm rot="16200000">
-            <a:off x="8649995" y="8260691"/>
+            <a:off x="8649995" y="7265805"/>
             <a:ext cx="1071637" cy="369332"/>
           </a:xfrm>
           <a:prstGeom prst="rect">
@@ -13422,7 +12832,7 @@
         </p:nvCxnSpPr>
         <p:spPr>
           <a:xfrm>
-            <a:off x="9156491" y="7572696"/>
+            <a:off x="9156491" y="6577810"/>
             <a:ext cx="0" cy="322535"/>
           </a:xfrm>
           <a:prstGeom prst="line">
@@ -13458,7 +12868,7 @@
         </p:nvSpPr>
         <p:spPr>
           <a:xfrm>
-            <a:off x="8713683" y="7195918"/>
+            <a:off x="8713683" y="6201032"/>
             <a:ext cx="885618" cy="369332"/>
           </a:xfrm>
           <a:prstGeom prst="rect">
@@ -13491,7 +12901,7 @@
         </p:nvCxnSpPr>
         <p:spPr>
           <a:xfrm flipV="1">
-            <a:off x="8479697" y="8208218"/>
+            <a:off x="8479697" y="7213332"/>
             <a:ext cx="381478" cy="1341"/>
           </a:xfrm>
           <a:prstGeom prst="line">
@@ -13527,7 +12937,7 @@
         </p:nvSpPr>
         <p:spPr>
           <a:xfrm>
-            <a:off x="7391400" y="8024893"/>
+            <a:off x="7391400" y="7030007"/>
             <a:ext cx="1088297" cy="369332"/>
           </a:xfrm>
           <a:prstGeom prst="rect">
@@ -13560,7 +12970,7 @@
         </p:nvCxnSpPr>
         <p:spPr>
           <a:xfrm>
-            <a:off x="8479697" y="8654534"/>
+            <a:off x="8479697" y="7659648"/>
             <a:ext cx="381478" cy="0"/>
           </a:xfrm>
           <a:prstGeom prst="line">
@@ -13596,7 +13006,7 @@
         </p:nvSpPr>
         <p:spPr>
           <a:xfrm>
-            <a:off x="7391400" y="8469868"/>
+            <a:off x="7391400" y="7474982"/>
             <a:ext cx="1088297" cy="369332"/>
           </a:xfrm>
           <a:prstGeom prst="rect">
@@ -13627,7 +13037,7 @@
         </p:nvSpPr>
         <p:spPr>
           <a:xfrm>
-            <a:off x="8763000" y="8469868"/>
+            <a:off x="8763000" y="7474982"/>
             <a:ext cx="419578" cy="369332"/>
           </a:xfrm>
           <a:prstGeom prst="rect">
@@ -13658,7 +13068,7 @@
         </p:nvSpPr>
         <p:spPr>
           <a:xfrm>
-            <a:off x="8775333" y="8023552"/>
+            <a:off x="8775333" y="7028666"/>
             <a:ext cx="419578" cy="369332"/>
           </a:xfrm>
           <a:prstGeom prst="rect">
@@ -13677,7 +13087,6 @@
               <a:rPr lang="en-US" sz="1800" dirty="0"/>
               <a:t>1</a:t>
             </a:r>
-            <a:endParaRPr lang="en-US" sz="1800" dirty="0"/>
           </a:p>
         </p:txBody>
       </p:sp>
@@ -13689,7 +13098,7 @@
         </p:nvSpPr>
         <p:spPr>
           <a:xfrm>
-            <a:off x="14722346" y="3424059"/>
+            <a:off x="14722346" y="2429173"/>
             <a:ext cx="909484" cy="369332"/>
           </a:xfrm>
           <a:prstGeom prst="rect">
@@ -13719,7 +13128,7 @@
         </p:nvSpPr>
         <p:spPr>
           <a:xfrm>
-            <a:off x="14716000" y="4262259"/>
+            <a:off x="14716000" y="3267373"/>
             <a:ext cx="909484" cy="369332"/>
           </a:xfrm>
           <a:prstGeom prst="rect">
@@ -13738,6 +13147,886 @@
               <a:t>tr_time</a:t>
             </a:r>
             <a:endParaRPr lang="en-US" sz="1800" dirty="0"/>
+          </a:p>
+        </p:txBody>
+      </p:sp>
+      <p:sp>
+        <p:nvSpPr>
+          <p:cNvPr id="302" name="TextBox 301"/>
+          <p:cNvSpPr txBox="1"/>
+          <p:nvPr/>
+        </p:nvSpPr>
+        <p:spPr>
+          <a:xfrm>
+            <a:off x="9030519" y="4122182"/>
+            <a:ext cx="570681" cy="369332"/>
+          </a:xfrm>
+          <a:prstGeom prst="rect">
+            <a:avLst/>
+          </a:prstGeom>
+          <a:noFill/>
+        </p:spPr>
+        <p:txBody>
+          <a:bodyPr wrap="square" lIns="91440" tIns="45720" rIns="91440" bIns="45720" rtlCol="0">
+            <a:spAutoFit/>
+          </a:bodyPr>
+          <a:lstStyle/>
+          <a:p>
+            <a:r>
+              <a:rPr lang="en-US" sz="1800" dirty="0" smtClean="0"/>
+              <a:t>10</a:t>
+            </a:r>
+            <a:endParaRPr lang="en-US" sz="1800" dirty="0"/>
+          </a:p>
+        </p:txBody>
+      </p:sp>
+      <p:cxnSp>
+        <p:nvCxnSpPr>
+          <p:cNvPr id="308" name="Straight Connector 307"/>
+          <p:cNvCxnSpPr/>
+          <p:nvPr/>
+        </p:nvCxnSpPr>
+        <p:spPr>
+          <a:xfrm flipV="1">
+            <a:off x="8976668" y="4072512"/>
+            <a:ext cx="264757" cy="230972"/>
+          </a:xfrm>
+          <a:prstGeom prst="line">
+            <a:avLst/>
+          </a:prstGeom>
+          <a:ln w="12700">
+            <a:solidFill>
+              <a:schemeClr val="tx1"/>
+            </a:solidFill>
+          </a:ln>
+        </p:spPr>
+        <p:style>
+          <a:lnRef idx="1">
+            <a:schemeClr val="accent1"/>
+          </a:lnRef>
+          <a:fillRef idx="0">
+            <a:schemeClr val="accent1"/>
+          </a:fillRef>
+          <a:effectRef idx="0">
+            <a:schemeClr val="accent1"/>
+          </a:effectRef>
+          <a:fontRef idx="minor">
+            <a:schemeClr val="tx1"/>
+          </a:fontRef>
+        </p:style>
+      </p:cxnSp>
+      <p:cxnSp>
+        <p:nvCxnSpPr>
+          <p:cNvPr id="309" name="Straight Connector 308"/>
+          <p:cNvCxnSpPr/>
+          <p:nvPr/>
+        </p:nvCxnSpPr>
+        <p:spPr>
+          <a:xfrm flipV="1">
+            <a:off x="6454543" y="5021946"/>
+            <a:ext cx="708257" cy="2968"/>
+          </a:xfrm>
+          <a:prstGeom prst="line">
+            <a:avLst/>
+          </a:prstGeom>
+          <a:ln w="38100">
+            <a:solidFill>
+              <a:schemeClr val="tx1"/>
+            </a:solidFill>
+            <a:prstDash val="sysDot"/>
+            <a:tailEnd type="none"/>
+          </a:ln>
+        </p:spPr>
+        <p:style>
+          <a:lnRef idx="1">
+            <a:schemeClr val="accent1"/>
+          </a:lnRef>
+          <a:fillRef idx="0">
+            <a:schemeClr val="accent1"/>
+          </a:fillRef>
+          <a:effectRef idx="0">
+            <a:schemeClr val="accent1"/>
+          </a:effectRef>
+          <a:fontRef idx="minor">
+            <a:schemeClr val="tx1"/>
+          </a:fontRef>
+        </p:style>
+      </p:cxnSp>
+      <p:cxnSp>
+        <p:nvCxnSpPr>
+          <p:cNvPr id="310" name="Straight Connector 309"/>
+          <p:cNvCxnSpPr/>
+          <p:nvPr/>
+        </p:nvCxnSpPr>
+        <p:spPr>
+          <a:xfrm>
+            <a:off x="5791200" y="5024914"/>
+            <a:ext cx="671941" cy="0"/>
+          </a:xfrm>
+          <a:prstGeom prst="line">
+            <a:avLst/>
+          </a:prstGeom>
+          <a:ln w="38100">
+            <a:solidFill>
+              <a:schemeClr val="tx1"/>
+            </a:solidFill>
+            <a:headEnd type="triangle"/>
+            <a:tailEnd type="none"/>
+          </a:ln>
+        </p:spPr>
+        <p:style>
+          <a:lnRef idx="1">
+            <a:schemeClr val="accent1"/>
+          </a:lnRef>
+          <a:fillRef idx="0">
+            <a:schemeClr val="accent1"/>
+          </a:fillRef>
+          <a:effectRef idx="0">
+            <a:schemeClr val="accent1"/>
+          </a:effectRef>
+          <a:fontRef idx="minor">
+            <a:schemeClr val="tx1"/>
+          </a:fontRef>
+        </p:style>
+      </p:cxnSp>
+      <p:cxnSp>
+        <p:nvCxnSpPr>
+          <p:cNvPr id="311" name="Elbow Connector 310"/>
+          <p:cNvCxnSpPr/>
+          <p:nvPr/>
+        </p:nvCxnSpPr>
+        <p:spPr>
+          <a:xfrm rot="16200000" flipV="1">
+            <a:off x="6968002" y="5217253"/>
+            <a:ext cx="586232" cy="201554"/>
+          </a:xfrm>
+          <a:prstGeom prst="bentConnector3">
+            <a:avLst>
+              <a:gd name="adj1" fmla="val 100374"/>
+            </a:avLst>
+          </a:prstGeom>
+          <a:ln w="38100">
+            <a:solidFill>
+              <a:schemeClr val="tx1"/>
+            </a:solidFill>
+            <a:tailEnd type="none"/>
+          </a:ln>
+        </p:spPr>
+        <p:style>
+          <a:lnRef idx="1">
+            <a:schemeClr val="accent1"/>
+          </a:lnRef>
+          <a:fillRef idx="0">
+            <a:schemeClr val="accent1"/>
+          </a:fillRef>
+          <a:effectRef idx="0">
+            <a:schemeClr val="accent1"/>
+          </a:effectRef>
+          <a:fontRef idx="minor">
+            <a:schemeClr val="tx1"/>
+          </a:fontRef>
+        </p:style>
+      </p:cxnSp>
+      <p:cxnSp>
+        <p:nvCxnSpPr>
+          <p:cNvPr id="323" name="Straight Connector 322"/>
+          <p:cNvCxnSpPr>
+            <a:stCxn id="349" idx="2"/>
+          </p:cNvCxnSpPr>
+          <p:nvPr/>
+        </p:nvCxnSpPr>
+        <p:spPr>
+          <a:xfrm flipH="1">
+            <a:off x="8288076" y="1436132"/>
+            <a:ext cx="34947" cy="1797968"/>
+          </a:xfrm>
+          <a:prstGeom prst="line">
+            <a:avLst/>
+          </a:prstGeom>
+          <a:ln w="38100">
+            <a:solidFill>
+              <a:schemeClr val="tx1"/>
+            </a:solidFill>
+            <a:tailEnd type="triangle"/>
+          </a:ln>
+        </p:spPr>
+        <p:style>
+          <a:lnRef idx="1">
+            <a:schemeClr val="accent1"/>
+          </a:lnRef>
+          <a:fillRef idx="0">
+            <a:schemeClr val="accent1"/>
+          </a:fillRef>
+          <a:effectRef idx="0">
+            <a:schemeClr val="accent1"/>
+          </a:effectRef>
+          <a:fontRef idx="minor">
+            <a:schemeClr val="tx1"/>
+          </a:fontRef>
+        </p:style>
+      </p:cxnSp>
+      <p:sp>
+        <p:nvSpPr>
+          <p:cNvPr id="324" name="TextBox 323"/>
+          <p:cNvSpPr txBox="1"/>
+          <p:nvPr/>
+        </p:nvSpPr>
+        <p:spPr>
+          <a:xfrm>
+            <a:off x="8308481" y="1894155"/>
+            <a:ext cx="570681" cy="369332"/>
+          </a:xfrm>
+          <a:prstGeom prst="rect">
+            <a:avLst/>
+          </a:prstGeom>
+          <a:noFill/>
+        </p:spPr>
+        <p:txBody>
+          <a:bodyPr wrap="square" lIns="91440" tIns="45720" rIns="91440" bIns="45720" rtlCol="0">
+            <a:spAutoFit/>
+          </a:bodyPr>
+          <a:lstStyle/>
+          <a:p>
+            <a:r>
+              <a:rPr lang="en-US" sz="1800" dirty="0" smtClean="0"/>
+              <a:t>10</a:t>
+            </a:r>
+            <a:endParaRPr lang="en-US" sz="1800" dirty="0"/>
+          </a:p>
+        </p:txBody>
+      </p:sp>
+      <p:cxnSp>
+        <p:nvCxnSpPr>
+          <p:cNvPr id="329" name="Straight Connector 328"/>
+          <p:cNvCxnSpPr/>
+          <p:nvPr/>
+        </p:nvCxnSpPr>
+        <p:spPr>
+          <a:xfrm flipV="1">
+            <a:off x="8136735" y="1730086"/>
+            <a:ext cx="323623" cy="304800"/>
+          </a:xfrm>
+          <a:prstGeom prst="line">
+            <a:avLst/>
+          </a:prstGeom>
+          <a:ln w="12700">
+            <a:solidFill>
+              <a:schemeClr val="tx1"/>
+            </a:solidFill>
+          </a:ln>
+        </p:spPr>
+        <p:style>
+          <a:lnRef idx="1">
+            <a:schemeClr val="accent1"/>
+          </a:lnRef>
+          <a:fillRef idx="0">
+            <a:schemeClr val="accent1"/>
+          </a:fillRef>
+          <a:effectRef idx="0">
+            <a:schemeClr val="accent1"/>
+          </a:effectRef>
+          <a:fontRef idx="minor">
+            <a:schemeClr val="tx1"/>
+          </a:fontRef>
+        </p:style>
+      </p:cxnSp>
+      <p:cxnSp>
+        <p:nvCxnSpPr>
+          <p:cNvPr id="337" name="Straight Connector 336"/>
+          <p:cNvCxnSpPr>
+            <a:stCxn id="338" idx="2"/>
+          </p:cNvCxnSpPr>
+          <p:nvPr/>
+        </p:nvCxnSpPr>
+        <p:spPr>
+          <a:xfrm>
+            <a:off x="10154887" y="1443514"/>
+            <a:ext cx="0" cy="635162"/>
+          </a:xfrm>
+          <a:prstGeom prst="line">
+            <a:avLst/>
+          </a:prstGeom>
+          <a:ln w="12700">
+            <a:solidFill>
+              <a:schemeClr val="tx1"/>
+            </a:solidFill>
+            <a:tailEnd type="triangle"/>
+          </a:ln>
+        </p:spPr>
+        <p:style>
+          <a:lnRef idx="1">
+            <a:schemeClr val="accent1"/>
+          </a:lnRef>
+          <a:fillRef idx="0">
+            <a:schemeClr val="accent1"/>
+          </a:fillRef>
+          <a:effectRef idx="0">
+            <a:schemeClr val="accent1"/>
+          </a:effectRef>
+          <a:fontRef idx="minor">
+            <a:schemeClr val="tx1"/>
+          </a:fontRef>
+        </p:style>
+      </p:cxnSp>
+      <p:sp>
+        <p:nvSpPr>
+          <p:cNvPr id="338" name="TextBox 337"/>
+          <p:cNvSpPr txBox="1"/>
+          <p:nvPr/>
+        </p:nvSpPr>
+        <p:spPr>
+          <a:xfrm>
+            <a:off x="9712078" y="1074182"/>
+            <a:ext cx="885618" cy="369332"/>
+          </a:xfrm>
+          <a:prstGeom prst="rect">
+            <a:avLst/>
+          </a:prstGeom>
+          <a:noFill/>
+        </p:spPr>
+        <p:txBody>
+          <a:bodyPr wrap="square" lIns="91440" tIns="45720" rIns="91440" bIns="45720" rtlCol="0">
+            <a:spAutoFit/>
+          </a:bodyPr>
+          <a:lstStyle/>
+          <a:p>
+            <a:pPr algn="ctr"/>
+            <a:r>
+              <a:rPr lang="en-US" sz="1800" dirty="0" err="1" smtClean="0"/>
+              <a:t>exSel</a:t>
+            </a:r>
+            <a:endParaRPr lang="en-US" sz="1800" dirty="0"/>
+          </a:p>
+        </p:txBody>
+      </p:sp>
+      <p:cxnSp>
+        <p:nvCxnSpPr>
+          <p:cNvPr id="347" name="Straight Connector 346"/>
+          <p:cNvCxnSpPr>
+            <a:stCxn id="348" idx="2"/>
+          </p:cNvCxnSpPr>
+          <p:nvPr/>
+        </p:nvCxnSpPr>
+        <p:spPr>
+          <a:xfrm>
+            <a:off x="9261248" y="1443514"/>
+            <a:ext cx="0" cy="705801"/>
+          </a:xfrm>
+          <a:prstGeom prst="line">
+            <a:avLst/>
+          </a:prstGeom>
+          <a:ln w="12700">
+            <a:solidFill>
+              <a:schemeClr val="tx1"/>
+            </a:solidFill>
+            <a:tailEnd type="triangle"/>
+          </a:ln>
+        </p:spPr>
+        <p:style>
+          <a:lnRef idx="1">
+            <a:schemeClr val="accent1"/>
+          </a:lnRef>
+          <a:fillRef idx="0">
+            <a:schemeClr val="accent1"/>
+          </a:fillRef>
+          <a:effectRef idx="0">
+            <a:schemeClr val="accent1"/>
+          </a:effectRef>
+          <a:fontRef idx="minor">
+            <a:schemeClr val="tx1"/>
+          </a:fontRef>
+        </p:style>
+      </p:cxnSp>
+      <p:sp>
+        <p:nvSpPr>
+          <p:cNvPr id="348" name="TextBox 347"/>
+          <p:cNvSpPr txBox="1"/>
+          <p:nvPr/>
+        </p:nvSpPr>
+        <p:spPr>
+          <a:xfrm>
+            <a:off x="8686800" y="1074182"/>
+            <a:ext cx="1148896" cy="369332"/>
+          </a:xfrm>
+          <a:prstGeom prst="rect">
+            <a:avLst/>
+          </a:prstGeom>
+          <a:noFill/>
+        </p:spPr>
+        <p:txBody>
+          <a:bodyPr wrap="square" lIns="91440" tIns="45720" rIns="91440" bIns="45720" rtlCol="0">
+            <a:spAutoFit/>
+          </a:bodyPr>
+          <a:lstStyle/>
+          <a:p>
+            <a:pPr algn="ctr"/>
+            <a:r>
+              <a:rPr lang="en-US" sz="1800" dirty="0" err="1" smtClean="0"/>
+              <a:t>exWen</a:t>
+            </a:r>
+            <a:endParaRPr lang="en-US" sz="1800" dirty="0"/>
+          </a:p>
+        </p:txBody>
+      </p:sp>
+      <p:sp>
+        <p:nvSpPr>
+          <p:cNvPr id="349" name="TextBox 348"/>
+          <p:cNvSpPr txBox="1"/>
+          <p:nvPr/>
+        </p:nvSpPr>
+        <p:spPr>
+          <a:xfrm>
+            <a:off x="7748575" y="1066800"/>
+            <a:ext cx="1148896" cy="369332"/>
+          </a:xfrm>
+          <a:prstGeom prst="rect">
+            <a:avLst/>
+          </a:prstGeom>
+          <a:noFill/>
+        </p:spPr>
+        <p:txBody>
+          <a:bodyPr wrap="square" lIns="91440" tIns="45720" rIns="91440" bIns="45720" rtlCol="0">
+            <a:spAutoFit/>
+          </a:bodyPr>
+          <a:lstStyle/>
+          <a:p>
+            <a:r>
+              <a:rPr lang="en-US" sz="1800" dirty="0" err="1" smtClean="0"/>
+              <a:t>exWrAddr</a:t>
+            </a:r>
+            <a:endParaRPr lang="en-US" sz="1800" dirty="0"/>
+          </a:p>
+        </p:txBody>
+      </p:sp>
+      <p:sp>
+        <p:nvSpPr>
+          <p:cNvPr id="350" name="Rounded Rectangle 349"/>
+          <p:cNvSpPr/>
+          <p:nvPr/>
+        </p:nvSpPr>
+        <p:spPr>
+          <a:xfrm>
+            <a:off x="4782568" y="3205956"/>
+            <a:ext cx="1770632" cy="762000"/>
+          </a:xfrm>
+          <a:prstGeom prst="roundRect">
+            <a:avLst>
+              <a:gd name="adj" fmla="val 13495"/>
+            </a:avLst>
+          </a:prstGeom>
+          <a:noFill/>
+          <a:ln>
+            <a:solidFill>
+              <a:schemeClr val="tx1"/>
+            </a:solidFill>
+          </a:ln>
+        </p:spPr>
+        <p:style>
+          <a:lnRef idx="2">
+            <a:schemeClr val="accent1">
+              <a:shade val="50000"/>
+            </a:schemeClr>
+          </a:lnRef>
+          <a:fillRef idx="1">
+            <a:schemeClr val="accent1"/>
+          </a:fillRef>
+          <a:effectRef idx="0">
+            <a:schemeClr val="accent1"/>
+          </a:effectRef>
+          <a:fontRef idx="minor">
+            <a:schemeClr val="lt1"/>
+          </a:fontRef>
+        </p:style>
+        <p:txBody>
+          <a:bodyPr lIns="91440" tIns="45720" rIns="91440" bIns="45720" spcCol="0" rtlCol="0" anchor="ctr"/>
+          <a:lstStyle/>
+          <a:p>
+            <a:pPr algn="ctr"/>
+            <a:endParaRPr lang="en-US" sz="1800"/>
+          </a:p>
+        </p:txBody>
+      </p:sp>
+      <p:sp>
+        <p:nvSpPr>
+          <p:cNvPr id="352" name="TextBox 351"/>
+          <p:cNvSpPr txBox="1"/>
+          <p:nvPr/>
+        </p:nvSpPr>
+        <p:spPr>
+          <a:xfrm>
+            <a:off x="4905884" y="3402290"/>
+            <a:ext cx="1524000" cy="369332"/>
+          </a:xfrm>
+          <a:prstGeom prst="rect">
+            <a:avLst/>
+          </a:prstGeom>
+          <a:noFill/>
+        </p:spPr>
+        <p:txBody>
+          <a:bodyPr wrap="square" lIns="91440" tIns="45720" rIns="91440" bIns="45720" rtlCol="0">
+            <a:spAutoFit/>
+          </a:bodyPr>
+          <a:lstStyle/>
+          <a:p>
+            <a:pPr algn="ctr"/>
+            <a:r>
+              <a:rPr lang="en-US" sz="1800" b="1" dirty="0" smtClean="0"/>
+              <a:t>Compare</a:t>
+            </a:r>
+            <a:endParaRPr lang="en-US" sz="4400" b="1" dirty="0"/>
+          </a:p>
+        </p:txBody>
+      </p:sp>
+      <p:cxnSp>
+        <p:nvCxnSpPr>
+          <p:cNvPr id="353" name="Straight Connector 352"/>
+          <p:cNvCxnSpPr/>
+          <p:nvPr/>
+        </p:nvCxnSpPr>
+        <p:spPr>
+          <a:xfrm>
+            <a:off x="5192623" y="2652734"/>
+            <a:ext cx="35" cy="550628"/>
+          </a:xfrm>
+          <a:prstGeom prst="line">
+            <a:avLst/>
+          </a:prstGeom>
+          <a:ln w="38100">
+            <a:solidFill>
+              <a:schemeClr val="tx1"/>
+            </a:solidFill>
+            <a:tailEnd type="triangle"/>
+          </a:ln>
+        </p:spPr>
+        <p:style>
+          <a:lnRef idx="1">
+            <a:schemeClr val="accent1"/>
+          </a:lnRef>
+          <a:fillRef idx="0">
+            <a:schemeClr val="accent1"/>
+          </a:fillRef>
+          <a:effectRef idx="0">
+            <a:schemeClr val="accent1"/>
+          </a:effectRef>
+          <a:fontRef idx="minor">
+            <a:schemeClr val="tx1"/>
+          </a:fontRef>
+        </p:style>
+      </p:cxnSp>
+      <p:sp>
+        <p:nvSpPr>
+          <p:cNvPr id="356" name="TextBox 355"/>
+          <p:cNvSpPr txBox="1"/>
+          <p:nvPr/>
+        </p:nvSpPr>
+        <p:spPr>
+          <a:xfrm>
+            <a:off x="5192623" y="2672377"/>
+            <a:ext cx="911328" cy="369332"/>
+          </a:xfrm>
+          <a:prstGeom prst="rect">
+            <a:avLst/>
+          </a:prstGeom>
+          <a:noFill/>
+        </p:spPr>
+        <p:txBody>
+          <a:bodyPr wrap="square" lIns="91440" tIns="45720" rIns="91440" bIns="45720" rtlCol="0">
+            <a:spAutoFit/>
+          </a:bodyPr>
+          <a:lstStyle/>
+          <a:p>
+            <a:r>
+              <a:rPr lang="en-US" sz="1800" dirty="0" smtClean="0"/>
+              <a:t>3FF</a:t>
+            </a:r>
+            <a:endParaRPr lang="en-US" sz="1800" dirty="0"/>
+          </a:p>
+        </p:txBody>
+      </p:sp>
+      <p:sp>
+        <p:nvSpPr>
+          <p:cNvPr id="360" name="TextBox 359"/>
+          <p:cNvSpPr txBox="1"/>
+          <p:nvPr/>
+        </p:nvSpPr>
+        <p:spPr>
+          <a:xfrm>
+            <a:off x="4648200" y="2713514"/>
+            <a:ext cx="479840" cy="369332"/>
+          </a:xfrm>
+          <a:prstGeom prst="rect">
+            <a:avLst/>
+          </a:prstGeom>
+          <a:noFill/>
+        </p:spPr>
+        <p:txBody>
+          <a:bodyPr wrap="square" lIns="91440" tIns="45720" rIns="91440" bIns="45720" rtlCol="0">
+            <a:spAutoFit/>
+          </a:bodyPr>
+          <a:lstStyle/>
+          <a:p>
+            <a:pPr algn="r"/>
+            <a:r>
+              <a:rPr lang="en-US" sz="1800" dirty="0" smtClean="0"/>
+              <a:t>10</a:t>
+            </a:r>
+            <a:endParaRPr lang="en-US" sz="1800" dirty="0"/>
+          </a:p>
+        </p:txBody>
+      </p:sp>
+      <p:cxnSp>
+        <p:nvCxnSpPr>
+          <p:cNvPr id="361" name="Straight Connector 360"/>
+          <p:cNvCxnSpPr/>
+          <p:nvPr/>
+        </p:nvCxnSpPr>
+        <p:spPr>
+          <a:xfrm flipV="1">
+            <a:off x="5014802" y="2787342"/>
+            <a:ext cx="264757" cy="230972"/>
+          </a:xfrm>
+          <a:prstGeom prst="line">
+            <a:avLst/>
+          </a:prstGeom>
+          <a:ln w="12700">
+            <a:solidFill>
+              <a:schemeClr val="tx1"/>
+            </a:solidFill>
+          </a:ln>
+        </p:spPr>
+        <p:style>
+          <a:lnRef idx="1">
+            <a:schemeClr val="accent1"/>
+          </a:lnRef>
+          <a:fillRef idx="0">
+            <a:schemeClr val="accent1"/>
+          </a:fillRef>
+          <a:effectRef idx="0">
+            <a:schemeClr val="accent1"/>
+          </a:effectRef>
+          <a:fontRef idx="minor">
+            <a:schemeClr val="tx1"/>
+          </a:fontRef>
+        </p:style>
+      </p:cxnSp>
+      <p:cxnSp>
+        <p:nvCxnSpPr>
+          <p:cNvPr id="364" name="Straight Connector 363"/>
+          <p:cNvCxnSpPr/>
+          <p:nvPr/>
+        </p:nvCxnSpPr>
+        <p:spPr>
+          <a:xfrm flipV="1">
+            <a:off x="6542116" y="3574041"/>
+            <a:ext cx="369505" cy="1010"/>
+          </a:xfrm>
+          <a:prstGeom prst="line">
+            <a:avLst/>
+          </a:prstGeom>
+          <a:ln w="12700">
+            <a:solidFill>
+              <a:schemeClr val="tx1"/>
+            </a:solidFill>
+            <a:tailEnd type="triangle"/>
+          </a:ln>
+        </p:spPr>
+        <p:style>
+          <a:lnRef idx="1">
+            <a:schemeClr val="accent1"/>
+          </a:lnRef>
+          <a:fillRef idx="0">
+            <a:schemeClr val="accent1"/>
+          </a:fillRef>
+          <a:effectRef idx="0">
+            <a:schemeClr val="accent1"/>
+          </a:effectRef>
+          <a:fontRef idx="minor">
+            <a:schemeClr val="tx1"/>
+          </a:fontRef>
+        </p:style>
+      </p:cxnSp>
+      <p:sp>
+        <p:nvSpPr>
+          <p:cNvPr id="365" name="TextBox 364"/>
+          <p:cNvSpPr txBox="1"/>
+          <p:nvPr/>
+        </p:nvSpPr>
+        <p:spPr>
+          <a:xfrm>
+            <a:off x="6543228" y="3207782"/>
+            <a:ext cx="455114" cy="369332"/>
+          </a:xfrm>
+          <a:prstGeom prst="rect">
+            <a:avLst/>
+          </a:prstGeom>
+          <a:noFill/>
+        </p:spPr>
+        <p:txBody>
+          <a:bodyPr wrap="square" lIns="91440" tIns="45720" rIns="91440" bIns="45720" rtlCol="0">
+            <a:spAutoFit/>
+          </a:bodyPr>
+          <a:lstStyle/>
+          <a:p>
+            <a:r>
+              <a:rPr lang="en-US" sz="1800" dirty="0" err="1" smtClean="0"/>
+              <a:t>sw</a:t>
+            </a:r>
+            <a:endParaRPr lang="en-US" sz="1800" dirty="0"/>
+          </a:p>
+        </p:txBody>
+      </p:sp>
+      <p:sp>
+        <p:nvSpPr>
+          <p:cNvPr id="366" name="TextBox 365"/>
+          <p:cNvSpPr txBox="1"/>
+          <p:nvPr/>
+        </p:nvSpPr>
+        <p:spPr>
+          <a:xfrm>
+            <a:off x="4595771" y="10286716"/>
+            <a:ext cx="570681" cy="369332"/>
+          </a:xfrm>
+          <a:prstGeom prst="rect">
+            <a:avLst/>
+          </a:prstGeom>
+          <a:noFill/>
+        </p:spPr>
+        <p:txBody>
+          <a:bodyPr wrap="square" lIns="91440" tIns="45720" rIns="91440" bIns="45720" rtlCol="0">
+            <a:spAutoFit/>
+          </a:bodyPr>
+          <a:lstStyle/>
+          <a:p>
+            <a:r>
+              <a:rPr lang="en-US" sz="1800" dirty="0"/>
+              <a:t>3</a:t>
+            </a:r>
+            <a:endParaRPr lang="en-US" sz="1800" dirty="0"/>
+          </a:p>
+        </p:txBody>
+      </p:sp>
+      <p:sp>
+        <p:nvSpPr>
+          <p:cNvPr id="367" name="TextBox 366"/>
+          <p:cNvSpPr txBox="1"/>
+          <p:nvPr/>
+        </p:nvSpPr>
+        <p:spPr>
+          <a:xfrm>
+            <a:off x="3901369" y="10282507"/>
+            <a:ext cx="570681" cy="369332"/>
+          </a:xfrm>
+          <a:prstGeom prst="rect">
+            <a:avLst/>
+          </a:prstGeom>
+          <a:noFill/>
+        </p:spPr>
+        <p:txBody>
+          <a:bodyPr wrap="square" lIns="91440" tIns="45720" rIns="91440" bIns="45720" rtlCol="0">
+            <a:spAutoFit/>
+          </a:bodyPr>
+          <a:lstStyle/>
+          <a:p>
+            <a:r>
+              <a:rPr lang="en-US" sz="1800" dirty="0"/>
+              <a:t>3</a:t>
+            </a:r>
+            <a:endParaRPr lang="en-US" sz="1800" dirty="0"/>
+          </a:p>
+        </p:txBody>
+      </p:sp>
+      <p:sp>
+        <p:nvSpPr>
+          <p:cNvPr id="370" name="TextBox 369"/>
+          <p:cNvSpPr txBox="1"/>
+          <p:nvPr/>
+        </p:nvSpPr>
+        <p:spPr>
+          <a:xfrm>
+            <a:off x="6287319" y="2561114"/>
+            <a:ext cx="570681" cy="369332"/>
+          </a:xfrm>
+          <a:prstGeom prst="rect">
+            <a:avLst/>
+          </a:prstGeom>
+          <a:noFill/>
+        </p:spPr>
+        <p:txBody>
+          <a:bodyPr wrap="square" lIns="91440" tIns="45720" rIns="91440" bIns="45720" rtlCol="0">
+            <a:spAutoFit/>
+          </a:bodyPr>
+          <a:lstStyle/>
+          <a:p>
+            <a:pPr algn="r"/>
+            <a:r>
+              <a:rPr lang="en-US" sz="1800" dirty="0" smtClean="0"/>
+              <a:t>10</a:t>
+            </a:r>
+            <a:endParaRPr lang="en-US" sz="1800" dirty="0"/>
+          </a:p>
+        </p:txBody>
+      </p:sp>
+      <p:sp>
+        <p:nvSpPr>
+          <p:cNvPr id="371" name="TextBox 370"/>
+          <p:cNvSpPr txBox="1"/>
+          <p:nvPr/>
+        </p:nvSpPr>
+        <p:spPr>
+          <a:xfrm>
+            <a:off x="6920686" y="2571762"/>
+            <a:ext cx="1537514" cy="369332"/>
+          </a:xfrm>
+          <a:prstGeom prst="rect">
+            <a:avLst/>
+          </a:prstGeom>
+          <a:noFill/>
+        </p:spPr>
+        <p:txBody>
+          <a:bodyPr wrap="square" lIns="91440" tIns="45720" rIns="91440" bIns="45720" rtlCol="0">
+            <a:spAutoFit/>
+          </a:bodyPr>
+          <a:lstStyle/>
+          <a:p>
+            <a:r>
+              <a:rPr lang="en-US" sz="1800" dirty="0" err="1" smtClean="0"/>
+              <a:t>write_cntr</a:t>
+            </a:r>
+            <a:endParaRPr lang="en-US" sz="1800" dirty="0"/>
+          </a:p>
+        </p:txBody>
+      </p:sp>
+      <p:sp>
+        <p:nvSpPr>
+          <p:cNvPr id="372" name="TextBox 371"/>
+          <p:cNvSpPr txBox="1"/>
+          <p:nvPr/>
+        </p:nvSpPr>
+        <p:spPr>
+          <a:xfrm>
+            <a:off x="12077604" y="4796314"/>
+            <a:ext cx="604256" cy="366365"/>
+          </a:xfrm>
+          <a:prstGeom prst="rect">
+            <a:avLst/>
+          </a:prstGeom>
+          <a:noFill/>
+        </p:spPr>
+        <p:txBody>
+          <a:bodyPr wrap="square" lIns="91440" tIns="45720" rIns="91440" bIns="45720" rtlCol="0">
+            <a:spAutoFit/>
+          </a:bodyPr>
+          <a:lstStyle/>
+          <a:p>
+            <a:r>
+              <a:rPr lang="en-US" sz="1800" dirty="0" smtClean="0">
+                <a:latin typeface="Courier" pitchFamily="49" charset="0"/>
+              </a:rPr>
+              <a:t>‘1’</a:t>
+            </a:r>
+            <a:endParaRPr lang="en-US" sz="1800" dirty="0">
+              <a:latin typeface="Courier" pitchFamily="49" charset="0"/>
+            </a:endParaRPr>
           </a:p>
         </p:txBody>
       </p:sp>

</xml_diff>

<commit_message>
one last minor edit to the Lab 2 block diagram.
</commit_message>
<xml_diff>
--- a/lab/lab2/ECE383_Lab2_Block_Diagram.pptx
+++ b/lab/lab2/ECE383_Lab2_Block_Diagram.pptx
@@ -192,7 +192,7 @@
           <a:p>
             <a:fld id="{8F2FD15C-CBA0-4BCE-BE84-26287205EF6C}" type="datetimeFigureOut">
               <a:rPr lang="en-US" smtClean="0"/>
-              <a:t>2/4/2017</a:t>
+              <a:t>2/6/2017</a:t>
             </a:fld>
             <a:endParaRPr lang="en-US"/>
           </a:p>
@@ -726,7 +726,7 @@
             <a:fld id="{1D8BD707-D9CF-40AE-B4C6-C98DA3205C09}" type="datetimeFigureOut">
               <a:rPr lang="en-US" smtClean="0"/>
               <a:pPr/>
-              <a:t>2/4/2017</a:t>
+              <a:t>2/6/2017</a:t>
             </a:fld>
             <a:endParaRPr lang="en-US"/>
           </a:p>
@@ -893,7 +893,7 @@
             <a:fld id="{1D8BD707-D9CF-40AE-B4C6-C98DA3205C09}" type="datetimeFigureOut">
               <a:rPr lang="en-US" smtClean="0"/>
               <a:pPr/>
-              <a:t>2/4/2017</a:t>
+              <a:t>2/6/2017</a:t>
             </a:fld>
             <a:endParaRPr lang="en-US"/>
           </a:p>
@@ -1070,7 +1070,7 @@
             <a:fld id="{1D8BD707-D9CF-40AE-B4C6-C98DA3205C09}" type="datetimeFigureOut">
               <a:rPr lang="en-US" smtClean="0"/>
               <a:pPr/>
-              <a:t>2/4/2017</a:t>
+              <a:t>2/6/2017</a:t>
             </a:fld>
             <a:endParaRPr lang="en-US"/>
           </a:p>
@@ -1237,7 +1237,7 @@
             <a:fld id="{1D8BD707-D9CF-40AE-B4C6-C98DA3205C09}" type="datetimeFigureOut">
               <a:rPr lang="en-US" smtClean="0"/>
               <a:pPr/>
-              <a:t>2/4/2017</a:t>
+              <a:t>2/6/2017</a:t>
             </a:fld>
             <a:endParaRPr lang="en-US"/>
           </a:p>
@@ -1480,7 +1480,7 @@
             <a:fld id="{1D8BD707-D9CF-40AE-B4C6-C98DA3205C09}" type="datetimeFigureOut">
               <a:rPr lang="en-US" smtClean="0"/>
               <a:pPr/>
-              <a:t>2/4/2017</a:t>
+              <a:t>2/6/2017</a:t>
             </a:fld>
             <a:endParaRPr lang="en-US"/>
           </a:p>
@@ -1765,7 +1765,7 @@
             <a:fld id="{1D8BD707-D9CF-40AE-B4C6-C98DA3205C09}" type="datetimeFigureOut">
               <a:rPr lang="en-US" smtClean="0"/>
               <a:pPr/>
-              <a:t>2/4/2017</a:t>
+              <a:t>2/6/2017</a:t>
             </a:fld>
             <a:endParaRPr lang="en-US"/>
           </a:p>
@@ -2184,7 +2184,7 @@
             <a:fld id="{1D8BD707-D9CF-40AE-B4C6-C98DA3205C09}" type="datetimeFigureOut">
               <a:rPr lang="en-US" smtClean="0"/>
               <a:pPr/>
-              <a:t>2/4/2017</a:t>
+              <a:t>2/6/2017</a:t>
             </a:fld>
             <a:endParaRPr lang="en-US"/>
           </a:p>
@@ -2299,7 +2299,7 @@
             <a:fld id="{1D8BD707-D9CF-40AE-B4C6-C98DA3205C09}" type="datetimeFigureOut">
               <a:rPr lang="en-US" smtClean="0"/>
               <a:pPr/>
-              <a:t>2/4/2017</a:t>
+              <a:t>2/6/2017</a:t>
             </a:fld>
             <a:endParaRPr lang="en-US"/>
           </a:p>
@@ -2391,7 +2391,7 @@
             <a:fld id="{1D8BD707-D9CF-40AE-B4C6-C98DA3205C09}" type="datetimeFigureOut">
               <a:rPr lang="en-US" smtClean="0"/>
               <a:pPr/>
-              <a:t>2/4/2017</a:t>
+              <a:t>2/6/2017</a:t>
             </a:fld>
             <a:endParaRPr lang="en-US"/>
           </a:p>
@@ -2665,7 +2665,7 @@
             <a:fld id="{1D8BD707-D9CF-40AE-B4C6-C98DA3205C09}" type="datetimeFigureOut">
               <a:rPr lang="en-US" smtClean="0"/>
               <a:pPr/>
-              <a:t>2/4/2017</a:t>
+              <a:t>2/6/2017</a:t>
             </a:fld>
             <a:endParaRPr lang="en-US"/>
           </a:p>
@@ -2915,7 +2915,7 @@
             <a:fld id="{1D8BD707-D9CF-40AE-B4C6-C98DA3205C09}" type="datetimeFigureOut">
               <a:rPr lang="en-US" smtClean="0"/>
               <a:pPr/>
-              <a:t>2/4/2017</a:t>
+              <a:t>2/6/2017</a:t>
             </a:fld>
             <a:endParaRPr lang="en-US"/>
           </a:p>
@@ -3125,7 +3125,7 @@
             <a:fld id="{1D8BD707-D9CF-40AE-B4C6-C98DA3205C09}" type="datetimeFigureOut">
               <a:rPr lang="en-US" smtClean="0"/>
               <a:pPr/>
-              <a:t>2/4/2017</a:t>
+              <a:t>2/6/2017</a:t>
             </a:fld>
             <a:endParaRPr lang="en-US"/>
           </a:p>
@@ -13901,7 +13901,6 @@
               <a:rPr lang="en-US" sz="1800" dirty="0"/>
               <a:t>3</a:t>
             </a:r>
-            <a:endParaRPr lang="en-US" sz="1800" dirty="0"/>
           </a:p>
         </p:txBody>
       </p:sp>
@@ -13931,7 +13930,6 @@
               <a:rPr lang="en-US" sz="1800" dirty="0"/>
               <a:t>3</a:t>
             </a:r>
-            <a:endParaRPr lang="en-US" sz="1800" dirty="0"/>
           </a:p>
         </p:txBody>
       </p:sp>
@@ -14030,6 +14028,43 @@
           </a:p>
         </p:txBody>
       </p:sp>
+      <p:cxnSp>
+        <p:nvCxnSpPr>
+          <p:cNvPr id="312" name="Straight Connector 311"/>
+          <p:cNvCxnSpPr/>
+          <p:nvPr/>
+        </p:nvCxnSpPr>
+        <p:spPr>
+          <a:xfrm>
+            <a:off x="6463975" y="6247051"/>
+            <a:ext cx="669715" cy="0"/>
+          </a:xfrm>
+          <a:prstGeom prst="line">
+            <a:avLst/>
+          </a:prstGeom>
+          <a:ln w="38100">
+            <a:solidFill>
+              <a:schemeClr val="tx1"/>
+            </a:solidFill>
+            <a:prstDash val="sysDot"/>
+            <a:tailEnd type="none"/>
+          </a:ln>
+        </p:spPr>
+        <p:style>
+          <a:lnRef idx="1">
+            <a:schemeClr val="accent1"/>
+          </a:lnRef>
+          <a:fillRef idx="0">
+            <a:schemeClr val="accent1"/>
+          </a:fillRef>
+          <a:effectRef idx="0">
+            <a:schemeClr val="accent1"/>
+          </a:effectRef>
+          <a:fontRef idx="minor">
+            <a:schemeClr val="tx1"/>
+          </a:fontRef>
+        </p:style>
+      </p:cxnSp>
     </p:spTree>
     <p:extLst>
       <p:ext uri="{BB962C8B-B14F-4D97-AF65-F5344CB8AC3E}">

</xml_diff>

<commit_message>
Adding clk and reset_n to to FSM on the Lab 2 block diagram.
</commit_message>
<xml_diff>
--- a/lab/lab2/ECE383_Lab2_Block_Diagram.pptx
+++ b/lab/lab2/ECE383_Lab2_Block_Diagram.pptx
@@ -14065,6 +14065,142 @@
           </a:fontRef>
         </p:style>
       </p:cxnSp>
+      <p:cxnSp>
+        <p:nvCxnSpPr>
+          <p:cNvPr id="321" name="Straight Connector 320"/>
+          <p:cNvCxnSpPr>
+            <a:endCxn id="369" idx="1"/>
+          </p:cNvCxnSpPr>
+          <p:nvPr/>
+        </p:nvCxnSpPr>
+        <p:spPr>
+          <a:xfrm>
+            <a:off x="609600" y="11398354"/>
+            <a:ext cx="339233" cy="0"/>
+          </a:xfrm>
+          <a:prstGeom prst="line">
+            <a:avLst/>
+          </a:prstGeom>
+          <a:ln w="12700">
+            <a:solidFill>
+              <a:schemeClr val="tx1"/>
+            </a:solidFill>
+            <a:tailEnd type="triangle"/>
+          </a:ln>
+        </p:spPr>
+        <p:style>
+          <a:lnRef idx="1">
+            <a:schemeClr val="accent1"/>
+          </a:lnRef>
+          <a:fillRef idx="0">
+            <a:schemeClr val="accent1"/>
+          </a:fillRef>
+          <a:effectRef idx="0">
+            <a:schemeClr val="accent1"/>
+          </a:effectRef>
+          <a:fontRef idx="minor">
+            <a:schemeClr val="tx1"/>
+          </a:fontRef>
+        </p:style>
+      </p:cxnSp>
+      <p:cxnSp>
+        <p:nvCxnSpPr>
+          <p:cNvPr id="346" name="Straight Connector 345"/>
+          <p:cNvCxnSpPr>
+            <a:endCxn id="377" idx="1"/>
+          </p:cNvCxnSpPr>
+          <p:nvPr/>
+        </p:nvCxnSpPr>
+        <p:spPr>
+          <a:xfrm>
+            <a:off x="607142" y="11631876"/>
+            <a:ext cx="341690" cy="0"/>
+          </a:xfrm>
+          <a:prstGeom prst="line">
+            <a:avLst/>
+          </a:prstGeom>
+          <a:ln w="12700">
+            <a:solidFill>
+              <a:schemeClr val="tx1"/>
+            </a:solidFill>
+            <a:tailEnd type="triangle"/>
+          </a:ln>
+        </p:spPr>
+        <p:style>
+          <a:lnRef idx="1">
+            <a:schemeClr val="accent1"/>
+          </a:lnRef>
+          <a:fillRef idx="0">
+            <a:schemeClr val="accent1"/>
+          </a:fillRef>
+          <a:effectRef idx="0">
+            <a:schemeClr val="accent1"/>
+          </a:effectRef>
+          <a:fontRef idx="minor">
+            <a:schemeClr val="tx1"/>
+          </a:fontRef>
+        </p:style>
+      </p:cxnSp>
+      <p:sp>
+        <p:nvSpPr>
+          <p:cNvPr id="369" name="TextBox 368"/>
+          <p:cNvSpPr txBox="1"/>
+          <p:nvPr/>
+        </p:nvSpPr>
+        <p:spPr>
+          <a:xfrm>
+            <a:off x="948833" y="11213688"/>
+            <a:ext cx="533400" cy="369332"/>
+          </a:xfrm>
+          <a:prstGeom prst="rect">
+            <a:avLst/>
+          </a:prstGeom>
+          <a:noFill/>
+        </p:spPr>
+        <p:txBody>
+          <a:bodyPr wrap="square" lIns="91440" tIns="45720" rIns="91440" bIns="45720" rtlCol="0">
+            <a:spAutoFit/>
+          </a:bodyPr>
+          <a:lstStyle/>
+          <a:p>
+            <a:r>
+              <a:rPr lang="en-US" sz="1800" dirty="0" err="1" smtClean="0"/>
+              <a:t>clk</a:t>
+            </a:r>
+            <a:endParaRPr lang="en-US" sz="1800" dirty="0"/>
+          </a:p>
+        </p:txBody>
+      </p:sp>
+      <p:sp>
+        <p:nvSpPr>
+          <p:cNvPr id="377" name="TextBox 376"/>
+          <p:cNvSpPr txBox="1"/>
+          <p:nvPr/>
+        </p:nvSpPr>
+        <p:spPr>
+          <a:xfrm>
+            <a:off x="948832" y="11447210"/>
+            <a:ext cx="992856" cy="369332"/>
+          </a:xfrm>
+          <a:prstGeom prst="rect">
+            <a:avLst/>
+          </a:prstGeom>
+          <a:noFill/>
+        </p:spPr>
+        <p:txBody>
+          <a:bodyPr wrap="square" lIns="91440" tIns="45720" rIns="91440" bIns="45720" rtlCol="0">
+            <a:spAutoFit/>
+          </a:bodyPr>
+          <a:lstStyle/>
+          <a:p>
+            <a:r>
+              <a:rPr lang="en-US" sz="1800" dirty="0" err="1"/>
+              <a:t>reset_n</a:t>
+            </a:r>
+            <a:endParaRPr lang="en-US" sz="1800" dirty="0"/>
+          </a:p>
+        </p:txBody>
+      </p:sp>
     </p:spTree>
     <p:extLst>
       <p:ext uri="{BB962C8B-B14F-4D97-AF65-F5344CB8AC3E}">

</xml_diff>